<commit_message>
Se envolvio el engine en un servidor o backend de fastapi, se corrigieron todas las correcciones del tribunal y se hicieron mejoras en el engnie para poder poner cualquier caracteristica en los modelos dinamicamente
</commit_message>
<xml_diff>
--- a/doc/Presentacion Taller 1.pptx
+++ b/doc/Presentacion Taller 1.pptx
@@ -6,12 +6,24 @@
   </p:sldMasterIdLst>
   <p:sldIdLst>
     <p:sldId id="256" r:id="rId2"/>
-    <p:sldId id="258" r:id="rId3"/>
-    <p:sldId id="257" r:id="rId4"/>
-    <p:sldId id="259" r:id="rId5"/>
-    <p:sldId id="260" r:id="rId6"/>
-    <p:sldId id="261" r:id="rId7"/>
-    <p:sldId id="262" r:id="rId8"/>
+    <p:sldId id="263" r:id="rId3"/>
+    <p:sldId id="258" r:id="rId4"/>
+    <p:sldId id="257" r:id="rId5"/>
+    <p:sldId id="259" r:id="rId6"/>
+    <p:sldId id="260" r:id="rId7"/>
+    <p:sldId id="261" r:id="rId8"/>
+    <p:sldId id="262" r:id="rId9"/>
+    <p:sldId id="264" r:id="rId10"/>
+    <p:sldId id="265" r:id="rId11"/>
+    <p:sldId id="266" r:id="rId12"/>
+    <p:sldId id="267" r:id="rId13"/>
+    <p:sldId id="268" r:id="rId14"/>
+    <p:sldId id="269" r:id="rId15"/>
+    <p:sldId id="270" r:id="rId16"/>
+    <p:sldId id="271" r:id="rId17"/>
+    <p:sldId id="272" r:id="rId18"/>
+    <p:sldId id="273" r:id="rId19"/>
+    <p:sldId id="274" r:id="rId20"/>
   </p:sldIdLst>
   <p:sldSz cx="12192000" cy="6858000"/>
   <p:notesSz cx="6858000" cy="9144000"/>
@@ -110,6 +122,11 @@
       </a:defRPr>
     </a:lvl9pPr>
   </p:defaultTextStyle>
+  <p:extLst>
+    <p:ext uri="{EFAFB233-063F-42B5-8137-9DF3F51BA10A}">
+      <p15:sldGuideLst xmlns:p15="http://schemas.microsoft.com/office/powerpoint/2012/main"/>
+    </p:ext>
+  </p:extLst>
 </p:presentation>
 </file>
 
@@ -759,7 +776,7 @@
           <a:p>
             <a:fld id="{BDE84978-5266-478D-95B1-3A7391F761AB}" type="datetimeFigureOut">
               <a:rPr lang="es-ES" smtClean="0"/>
-              <a:t>22/09/2024</a:t>
+              <a:t>24/09/2024</a:t>
             </a:fld>
             <a:endParaRPr lang="es-ES"/>
           </a:p>
@@ -1879,7 +1896,7 @@
           <a:p>
             <a:fld id="{BDE84978-5266-478D-95B1-3A7391F761AB}" type="datetimeFigureOut">
               <a:rPr lang="es-ES" smtClean="0"/>
-              <a:t>22/09/2024</a:t>
+              <a:t>24/09/2024</a:t>
             </a:fld>
             <a:endParaRPr lang="es-ES"/>
           </a:p>
@@ -2890,7 +2907,7 @@
           <a:p>
             <a:fld id="{BDE84978-5266-478D-95B1-3A7391F761AB}" type="datetimeFigureOut">
               <a:rPr lang="es-ES" smtClean="0"/>
-              <a:t>22/09/2024</a:t>
+              <a:t>24/09/2024</a:t>
             </a:fld>
             <a:endParaRPr lang="es-ES"/>
           </a:p>
@@ -4060,7 +4077,7 @@
           <a:p>
             <a:fld id="{BDE84978-5266-478D-95B1-3A7391F761AB}" type="datetimeFigureOut">
               <a:rPr lang="es-ES" smtClean="0"/>
-              <a:t>22/09/2024</a:t>
+              <a:t>24/09/2024</a:t>
             </a:fld>
             <a:endParaRPr lang="es-ES"/>
           </a:p>
@@ -5121,7 +5138,7 @@
           <a:p>
             <a:fld id="{BDE84978-5266-478D-95B1-3A7391F761AB}" type="datetimeFigureOut">
               <a:rPr lang="es-ES" smtClean="0"/>
-              <a:t>22/09/2024</a:t>
+              <a:t>24/09/2024</a:t>
             </a:fld>
             <a:endParaRPr lang="es-ES"/>
           </a:p>
@@ -5767,7 +5784,7 @@
           <a:p>
             <a:fld id="{BDE84978-5266-478D-95B1-3A7391F761AB}" type="datetimeFigureOut">
               <a:rPr lang="es-ES" smtClean="0"/>
-              <a:t>22/09/2024</a:t>
+              <a:t>24/09/2024</a:t>
             </a:fld>
             <a:endParaRPr lang="es-ES"/>
           </a:p>
@@ -6614,7 +6631,7 @@
           <a:p>
             <a:fld id="{BDE84978-5266-478D-95B1-3A7391F761AB}" type="datetimeFigureOut">
               <a:rPr lang="es-ES" smtClean="0"/>
-              <a:t>22/09/2024</a:t>
+              <a:t>24/09/2024</a:t>
             </a:fld>
             <a:endParaRPr lang="es-ES"/>
           </a:p>
@@ -6789,7 +6806,7 @@
           <a:p>
             <a:fld id="{BDE84978-5266-478D-95B1-3A7391F761AB}" type="datetimeFigureOut">
               <a:rPr lang="es-ES" smtClean="0"/>
-              <a:t>22/09/2024</a:t>
+              <a:t>24/09/2024</a:t>
             </a:fld>
             <a:endParaRPr lang="es-ES"/>
           </a:p>
@@ -7787,7 +7804,7 @@
           <a:p>
             <a:fld id="{BDE84978-5266-478D-95B1-3A7391F761AB}" type="datetimeFigureOut">
               <a:rPr lang="es-ES" smtClean="0"/>
-              <a:t>22/09/2024</a:t>
+              <a:t>24/09/2024</a:t>
             </a:fld>
             <a:endParaRPr lang="es-ES"/>
           </a:p>
@@ -7993,7 +8010,7 @@
           <a:p>
             <a:fld id="{BDE84978-5266-478D-95B1-3A7391F761AB}" type="datetimeFigureOut">
               <a:rPr lang="es-ES" smtClean="0"/>
-              <a:t>22/09/2024</a:t>
+              <a:t>24/09/2024</a:t>
             </a:fld>
             <a:endParaRPr lang="es-ES"/>
           </a:p>
@@ -9055,7 +9072,7 @@
           <a:p>
             <a:fld id="{BDE84978-5266-478D-95B1-3A7391F761AB}" type="datetimeFigureOut">
               <a:rPr lang="es-ES" smtClean="0"/>
-              <a:t>22/09/2024</a:t>
+              <a:t>24/09/2024</a:t>
             </a:fld>
             <a:endParaRPr lang="es-ES"/>
           </a:p>
@@ -9327,7 +9344,7 @@
           <a:p>
             <a:fld id="{BDE84978-5266-478D-95B1-3A7391F761AB}" type="datetimeFigureOut">
               <a:rPr lang="es-ES" smtClean="0"/>
-              <a:t>22/09/2024</a:t>
+              <a:t>24/09/2024</a:t>
             </a:fld>
             <a:endParaRPr lang="es-ES"/>
           </a:p>
@@ -9709,7 +9726,7 @@
           <a:p>
             <a:fld id="{BDE84978-5266-478D-95B1-3A7391F761AB}" type="datetimeFigureOut">
               <a:rPr lang="es-ES" smtClean="0"/>
-              <a:t>22/09/2024</a:t>
+              <a:t>24/09/2024</a:t>
             </a:fld>
             <a:endParaRPr lang="es-ES"/>
           </a:p>
@@ -9827,7 +9844,7 @@
           <a:p>
             <a:fld id="{BDE84978-5266-478D-95B1-3A7391F761AB}" type="datetimeFigureOut">
               <a:rPr lang="es-ES" smtClean="0"/>
-              <a:t>22/09/2024</a:t>
+              <a:t>24/09/2024</a:t>
             </a:fld>
             <a:endParaRPr lang="es-ES"/>
           </a:p>
@@ -9922,7 +9939,7 @@
           <a:p>
             <a:fld id="{BDE84978-5266-478D-95B1-3A7391F761AB}" type="datetimeFigureOut">
               <a:rPr lang="es-ES" smtClean="0"/>
-              <a:t>22/09/2024</a:t>
+              <a:t>24/09/2024</a:t>
             </a:fld>
             <a:endParaRPr lang="es-ES"/>
           </a:p>
@@ -11031,7 +11048,7 @@
           <a:p>
             <a:fld id="{BDE84978-5266-478D-95B1-3A7391F761AB}" type="datetimeFigureOut">
               <a:rPr lang="es-ES" smtClean="0"/>
-              <a:t>22/09/2024</a:t>
+              <a:t>24/09/2024</a:t>
             </a:fld>
             <a:endParaRPr lang="es-ES"/>
           </a:p>
@@ -12164,7 +12181,7 @@
           <a:p>
             <a:fld id="{BDE84978-5266-478D-95B1-3A7391F761AB}" type="datetimeFigureOut">
               <a:rPr lang="es-ES" smtClean="0"/>
-              <a:t>22/09/2024</a:t>
+              <a:t>24/09/2024</a:t>
             </a:fld>
             <a:endParaRPr lang="es-ES"/>
           </a:p>
@@ -13192,7 +13209,7 @@
           <a:p>
             <a:fld id="{BDE84978-5266-478D-95B1-3A7391F761AB}" type="datetimeFigureOut">
               <a:rPr lang="es-ES" smtClean="0"/>
-              <a:t>22/09/2024</a:t>
+              <a:t>24/09/2024</a:t>
             </a:fld>
             <a:endParaRPr lang="es-ES"/>
           </a:p>
@@ -13766,7 +13783,7 @@
         <p:spPr>
           <a:xfrm>
             <a:off x="1154955" y="1454330"/>
-            <a:ext cx="9269205" cy="3323050"/>
+            <a:ext cx="9269205" cy="3117670"/>
           </a:xfrm>
         </p:spPr>
         <p:txBody>
@@ -13775,7 +13792,15 @@
           <a:p>
             <a:r>
               <a:rPr lang="es-ES" sz="4000" b="1" dirty="0"/>
-              <a:t>Desarrollo e implementación de un Sistema de Recomendación basado en </a:t>
+              <a:t>I</a:t>
+            </a:r>
+            <a:r>
+              <a:rPr lang="es-ES" sz="4000" b="1" dirty="0" smtClean="0"/>
+              <a:t>mplementación </a:t>
+            </a:r>
+            <a:r>
+              <a:rPr lang="es-ES" sz="4000" b="1" dirty="0"/>
+              <a:t>de un Sistema de Recomendación basado en </a:t>
             </a:r>
             <a:r>
               <a:rPr lang="es-ES" sz="4000" b="1" dirty="0" err="1"/>
@@ -13791,7 +13816,15 @@
             </a:r>
             <a:r>
               <a:rPr lang="es-ES" sz="4000" b="1" dirty="0"/>
-              <a:t> para el proyecto z17.</a:t>
+              <a:t> </a:t>
+            </a:r>
+            <a:r>
+              <a:rPr lang="es-ES" sz="4000" b="1" dirty="0" smtClean="0"/>
+              <a:t>para las plataformas del </a:t>
+            </a:r>
+            <a:r>
+              <a:rPr lang="es-ES" sz="4000" b="1" dirty="0"/>
+              <a:t>proyecto z17.</a:t>
             </a:r>
             <a:r>
               <a:rPr lang="es-ES" sz="4000" dirty="0"/>
@@ -13814,15 +13847,82 @@
             <p:ph type="subTitle" idx="1"/>
           </p:nvPr>
         </p:nvSpPr>
-        <p:spPr/>
+        <p:spPr>
+          <a:xfrm>
+            <a:off x="1154955" y="4572000"/>
+            <a:ext cx="8825658" cy="1475374"/>
+          </a:xfrm>
+        </p:spPr>
         <p:txBody>
-          <a:bodyPr/>
+          <a:bodyPr>
+            <a:normAutofit fontScale="92500" lnSpcReduction="10000"/>
+          </a:bodyPr>
           <a:lstStyle/>
           <a:p>
             <a:r>
               <a:rPr lang="en-US" dirty="0" smtClean="0"/>
               <a:t>Autor: alejandro Figueroa Rodriguez</a:t>
             </a:r>
+          </a:p>
+          <a:p>
+            <a:r>
+              <a:rPr lang="en-US" dirty="0" smtClean="0"/>
+              <a:t>TUTORES: </a:t>
+            </a:r>
+          </a:p>
+          <a:p>
+            <a:r>
+              <a:rPr lang="es-ES" dirty="0" smtClean="0"/>
+              <a:t>	</a:t>
+            </a:r>
+            <a:r>
+              <a:rPr lang="es-ES" dirty="0" err="1" smtClean="0"/>
+              <a:t>mSc</a:t>
+            </a:r>
+            <a:r>
+              <a:rPr lang="es-ES" dirty="0" smtClean="0"/>
+              <a:t>. </a:t>
+            </a:r>
+            <a:r>
+              <a:rPr lang="es-ES" dirty="0" err="1" smtClean="0"/>
+              <a:t>Yadier</a:t>
+            </a:r>
+            <a:r>
+              <a:rPr lang="es-ES" dirty="0" smtClean="0"/>
+              <a:t> </a:t>
+            </a:r>
+            <a:r>
+              <a:rPr lang="es-ES" dirty="0"/>
+              <a:t>Perdomo Cuevas</a:t>
+            </a:r>
+          </a:p>
+          <a:p>
+            <a:r>
+              <a:rPr lang="es-ES" dirty="0" smtClean="0"/>
+              <a:t>	</a:t>
+            </a:r>
+            <a:r>
+              <a:rPr lang="es-ES" dirty="0" err="1" smtClean="0"/>
+              <a:t>msc</a:t>
+            </a:r>
+            <a:r>
+              <a:rPr lang="es-ES" dirty="0" smtClean="0"/>
+              <a:t>. </a:t>
+            </a:r>
+            <a:r>
+              <a:rPr lang="es-ES" dirty="0" err="1" smtClean="0"/>
+              <a:t>Aneyty</a:t>
+            </a:r>
+            <a:r>
+              <a:rPr lang="es-ES" dirty="0" smtClean="0"/>
+              <a:t> </a:t>
+            </a:r>
+            <a:r>
+              <a:rPr lang="es-ES" dirty="0"/>
+              <a:t>Martin García</a:t>
+            </a:r>
+          </a:p>
+          <a:p>
             <a:endParaRPr lang="es-ES" dirty="0"/>
           </a:p>
         </p:txBody>
@@ -13844,6 +13944,2211 @@
       </p:par>
     </p:tnLst>
   </p:timing>
+</p:sld>
+</file>
+
+<file path=ppt/slides/slide10.xml><?xml version="1.0" encoding="utf-8"?>
+<p:sld xmlns:a="http://schemas.openxmlformats.org/drawingml/2006/main" xmlns:r="http://schemas.openxmlformats.org/officeDocument/2006/relationships" xmlns:p="http://schemas.openxmlformats.org/presentationml/2006/main">
+  <p:cSld>
+    <p:spTree>
+      <p:nvGrpSpPr>
+        <p:cNvPr id="1" name=""/>
+        <p:cNvGrpSpPr/>
+        <p:nvPr/>
+      </p:nvGrpSpPr>
+      <p:grpSpPr>
+        <a:xfrm>
+          <a:off x="0" y="0"/>
+          <a:ext cx="0" cy="0"/>
+          <a:chOff x="0" y="0"/>
+          <a:chExt cx="0" cy="0"/>
+        </a:xfrm>
+      </p:grpSpPr>
+      <p:sp>
+        <p:nvSpPr>
+          <p:cNvPr id="2" name="Título 1"/>
+          <p:cNvSpPr>
+            <a:spLocks noGrp="1"/>
+          </p:cNvSpPr>
+          <p:nvPr>
+            <p:ph type="title"/>
+          </p:nvPr>
+        </p:nvSpPr>
+        <p:spPr/>
+        <p:txBody>
+          <a:bodyPr/>
+          <a:lstStyle/>
+          <a:p>
+            <a:r>
+              <a:rPr lang="es-ES" dirty="0" smtClean="0"/>
+              <a:t>Propuesta de Solución</a:t>
+            </a:r>
+            <a:endParaRPr lang="es-ES" dirty="0"/>
+          </a:p>
+        </p:txBody>
+      </p:sp>
+      <p:pic>
+        <p:nvPicPr>
+          <p:cNvPr id="4" name="Marcador de contenido 3" descr="Captura de pantalla 2024-09-05 002909"/>
+          <p:cNvPicPr>
+            <a:picLocks noGrp="1"/>
+          </p:cNvPicPr>
+          <p:nvPr>
+            <p:ph idx="1"/>
+          </p:nvPr>
+        </p:nvPicPr>
+        <p:blipFill>
+          <a:blip r:embed="rId2">
+            <a:extLst>
+              <a:ext uri="{28A0092B-C50C-407E-A947-70E740481C1C}">
+                <a14:useLocalDpi xmlns:a14="http://schemas.microsoft.com/office/drawing/2010/main" val="0"/>
+              </a:ext>
+            </a:extLst>
+          </a:blip>
+          <a:srcRect/>
+          <a:stretch>
+            <a:fillRect/>
+          </a:stretch>
+        </p:blipFill>
+        <p:spPr bwMode="auto">
+          <a:xfrm>
+            <a:off x="1845420" y="1772072"/>
+            <a:ext cx="8553802" cy="4845354"/>
+          </a:xfrm>
+          <a:prstGeom prst="rect">
+            <a:avLst/>
+          </a:prstGeom>
+          <a:noFill/>
+          <a:ln>
+            <a:noFill/>
+          </a:ln>
+        </p:spPr>
+      </p:pic>
+    </p:spTree>
+    <p:extLst>
+      <p:ext uri="{BB962C8B-B14F-4D97-AF65-F5344CB8AC3E}">
+        <p14:creationId xmlns:p14="http://schemas.microsoft.com/office/powerpoint/2010/main" val="2923206541"/>
+      </p:ext>
+    </p:extLst>
+  </p:cSld>
+  <p:clrMapOvr>
+    <a:masterClrMapping/>
+  </p:clrMapOvr>
+</p:sld>
+</file>
+
+<file path=ppt/slides/slide11.xml><?xml version="1.0" encoding="utf-8"?>
+<p:sld xmlns:a="http://schemas.openxmlformats.org/drawingml/2006/main" xmlns:r="http://schemas.openxmlformats.org/officeDocument/2006/relationships" xmlns:p="http://schemas.openxmlformats.org/presentationml/2006/main">
+  <p:cSld>
+    <p:spTree>
+      <p:nvGrpSpPr>
+        <p:cNvPr id="1" name=""/>
+        <p:cNvGrpSpPr/>
+        <p:nvPr/>
+      </p:nvGrpSpPr>
+      <p:grpSpPr>
+        <a:xfrm>
+          <a:off x="0" y="0"/>
+          <a:ext cx="0" cy="0"/>
+          <a:chOff x="0" y="0"/>
+          <a:chExt cx="0" cy="0"/>
+        </a:xfrm>
+      </p:grpSpPr>
+      <p:sp>
+        <p:nvSpPr>
+          <p:cNvPr id="2" name="Título 1"/>
+          <p:cNvSpPr>
+            <a:spLocks noGrp="1"/>
+          </p:cNvSpPr>
+          <p:nvPr>
+            <p:ph type="title"/>
+          </p:nvPr>
+        </p:nvSpPr>
+        <p:spPr/>
+        <p:txBody>
+          <a:bodyPr/>
+          <a:lstStyle/>
+          <a:p>
+            <a:r>
+              <a:rPr lang="es-ES" dirty="0" smtClean="0"/>
+              <a:t>Modelos</a:t>
+            </a:r>
+            <a:endParaRPr lang="es-ES" dirty="0"/>
+          </a:p>
+        </p:txBody>
+      </p:sp>
+      <p:pic>
+        <p:nvPicPr>
+          <p:cNvPr id="4" name="Marcador de contenido 3" descr="Captura de pantalla 2024-09-04 234442"/>
+          <p:cNvPicPr>
+            <a:picLocks noGrp="1"/>
+          </p:cNvPicPr>
+          <p:nvPr>
+            <p:ph idx="1"/>
+          </p:nvPr>
+        </p:nvPicPr>
+        <p:blipFill>
+          <a:blip r:embed="rId2" cstate="print">
+            <a:extLst>
+              <a:ext uri="{28A0092B-C50C-407E-A947-70E740481C1C}">
+                <a14:useLocalDpi xmlns:a14="http://schemas.microsoft.com/office/drawing/2010/main" val="0"/>
+              </a:ext>
+            </a:extLst>
+          </a:blip>
+          <a:srcRect/>
+          <a:stretch>
+            <a:fillRect/>
+          </a:stretch>
+        </p:blipFill>
+        <p:spPr bwMode="auto">
+          <a:xfrm>
+            <a:off x="121293" y="2303871"/>
+            <a:ext cx="4180741" cy="3051900"/>
+          </a:xfrm>
+          <a:prstGeom prst="rect">
+            <a:avLst/>
+          </a:prstGeom>
+          <a:noFill/>
+          <a:ln>
+            <a:noFill/>
+          </a:ln>
+        </p:spPr>
+      </p:pic>
+      <p:pic>
+        <p:nvPicPr>
+          <p:cNvPr id="5" name="Imagen 4" descr="Captura de pantalla 2024-09-05 001916"/>
+          <p:cNvPicPr/>
+          <p:nvPr/>
+        </p:nvPicPr>
+        <p:blipFill>
+          <a:blip r:embed="rId3">
+            <a:extLst>
+              <a:ext uri="{28A0092B-C50C-407E-A947-70E740481C1C}">
+                <a14:useLocalDpi xmlns:a14="http://schemas.microsoft.com/office/drawing/2010/main" val="0"/>
+              </a:ext>
+            </a:extLst>
+          </a:blip>
+          <a:srcRect/>
+          <a:stretch>
+            <a:fillRect/>
+          </a:stretch>
+        </p:blipFill>
+        <p:spPr bwMode="auto">
+          <a:xfrm>
+            <a:off x="7938655" y="2303871"/>
+            <a:ext cx="4253345" cy="3051900"/>
+          </a:xfrm>
+          <a:prstGeom prst="rect">
+            <a:avLst/>
+          </a:prstGeom>
+          <a:noFill/>
+          <a:ln>
+            <a:noFill/>
+          </a:ln>
+        </p:spPr>
+      </p:pic>
+      <p:pic>
+        <p:nvPicPr>
+          <p:cNvPr id="6" name="Imagen 5" descr="Captura de pantalla 2024-09-04 232401"/>
+          <p:cNvPicPr/>
+          <p:nvPr/>
+        </p:nvPicPr>
+        <p:blipFill>
+          <a:blip r:embed="rId4">
+            <a:extLst>
+              <a:ext uri="{28A0092B-C50C-407E-A947-70E740481C1C}">
+                <a14:useLocalDpi xmlns:a14="http://schemas.microsoft.com/office/drawing/2010/main" val="0"/>
+              </a:ext>
+            </a:extLst>
+          </a:blip>
+          <a:srcRect/>
+          <a:stretch>
+            <a:fillRect/>
+          </a:stretch>
+        </p:blipFill>
+        <p:spPr bwMode="auto">
+          <a:xfrm>
+            <a:off x="4040776" y="3056709"/>
+            <a:ext cx="4214950" cy="3712482"/>
+          </a:xfrm>
+          <a:prstGeom prst="rect">
+            <a:avLst/>
+          </a:prstGeom>
+          <a:noFill/>
+          <a:ln>
+            <a:noFill/>
+          </a:ln>
+        </p:spPr>
+      </p:pic>
+      <p:sp>
+        <p:nvSpPr>
+          <p:cNvPr id="7" name="CuadroTexto 6"/>
+          <p:cNvSpPr txBox="1"/>
+          <p:nvPr/>
+        </p:nvSpPr>
+        <p:spPr>
+          <a:xfrm>
+            <a:off x="1366737" y="5355771"/>
+            <a:ext cx="1428596" cy="307777"/>
+          </a:xfrm>
+          <a:prstGeom prst="rect">
+            <a:avLst/>
+          </a:prstGeom>
+          <a:noFill/>
+        </p:spPr>
+        <p:txBody>
+          <a:bodyPr wrap="none" rtlCol="0">
+            <a:spAutoFit/>
+          </a:bodyPr>
+          <a:lstStyle/>
+          <a:p>
+            <a:r>
+              <a:rPr lang="en-US" sz="1400" dirty="0" err="1" smtClean="0"/>
+              <a:t>Recuperaci</a:t>
+            </a:r>
+            <a:r>
+              <a:rPr lang="es-ES" sz="1400" dirty="0" err="1" smtClean="0"/>
+              <a:t>ó</a:t>
+            </a:r>
+            <a:r>
+              <a:rPr lang="en-US" sz="1400" dirty="0" smtClean="0"/>
+              <a:t>n</a:t>
+            </a:r>
+            <a:endParaRPr lang="es-ES" sz="1400" dirty="0"/>
+          </a:p>
+        </p:txBody>
+      </p:sp>
+      <p:sp>
+        <p:nvSpPr>
+          <p:cNvPr id="8" name="CuadroTexto 7"/>
+          <p:cNvSpPr txBox="1"/>
+          <p:nvPr/>
+        </p:nvSpPr>
+        <p:spPr>
+          <a:xfrm>
+            <a:off x="9442980" y="5428906"/>
+            <a:ext cx="1300356" cy="307777"/>
+          </a:xfrm>
+          <a:prstGeom prst="rect">
+            <a:avLst/>
+          </a:prstGeom>
+          <a:noFill/>
+        </p:spPr>
+        <p:txBody>
+          <a:bodyPr wrap="none" rtlCol="0">
+            <a:spAutoFit/>
+          </a:bodyPr>
+          <a:lstStyle/>
+          <a:p>
+            <a:r>
+              <a:rPr lang="en-US" sz="1400" dirty="0" err="1" smtClean="0"/>
+              <a:t>Clasificaci</a:t>
+            </a:r>
+            <a:r>
+              <a:rPr lang="es-ES" sz="1400" dirty="0" err="1" smtClean="0"/>
+              <a:t>ó</a:t>
+            </a:r>
+            <a:r>
+              <a:rPr lang="en-US" sz="1400" dirty="0" smtClean="0"/>
+              <a:t>n</a:t>
+            </a:r>
+            <a:endParaRPr lang="es-ES" sz="1400" dirty="0"/>
+          </a:p>
+        </p:txBody>
+      </p:sp>
+      <p:sp>
+        <p:nvSpPr>
+          <p:cNvPr id="9" name="CuadroTexto 8"/>
+          <p:cNvSpPr txBox="1"/>
+          <p:nvPr/>
+        </p:nvSpPr>
+        <p:spPr>
+          <a:xfrm>
+            <a:off x="4978524" y="2648093"/>
+            <a:ext cx="1042273" cy="307777"/>
+          </a:xfrm>
+          <a:prstGeom prst="rect">
+            <a:avLst/>
+          </a:prstGeom>
+          <a:noFill/>
+        </p:spPr>
+        <p:txBody>
+          <a:bodyPr wrap="none" rtlCol="0">
+            <a:spAutoFit/>
+          </a:bodyPr>
+          <a:lstStyle/>
+          <a:p>
+            <a:r>
+              <a:rPr lang="en-US" sz="1400" dirty="0" smtClean="0"/>
+              <a:t>Dos </a:t>
+            </a:r>
+            <a:r>
+              <a:rPr lang="es-ES" sz="1400" dirty="0" smtClean="0"/>
+              <a:t>Torres</a:t>
+            </a:r>
+            <a:endParaRPr lang="es-ES" sz="1400" dirty="0"/>
+          </a:p>
+        </p:txBody>
+      </p:sp>
+    </p:spTree>
+    <p:extLst>
+      <p:ext uri="{BB962C8B-B14F-4D97-AF65-F5344CB8AC3E}">
+        <p14:creationId xmlns:p14="http://schemas.microsoft.com/office/powerpoint/2010/main" val="1901492565"/>
+      </p:ext>
+    </p:extLst>
+  </p:cSld>
+  <p:clrMapOvr>
+    <a:masterClrMapping/>
+  </p:clrMapOvr>
+</p:sld>
+</file>
+
+<file path=ppt/slides/slide12.xml><?xml version="1.0" encoding="utf-8"?>
+<p:sld xmlns:a="http://schemas.openxmlformats.org/drawingml/2006/main" xmlns:r="http://schemas.openxmlformats.org/officeDocument/2006/relationships" xmlns:p="http://schemas.openxmlformats.org/presentationml/2006/main">
+  <p:cSld>
+    <p:spTree>
+      <p:nvGrpSpPr>
+        <p:cNvPr id="1" name=""/>
+        <p:cNvGrpSpPr/>
+        <p:nvPr/>
+      </p:nvGrpSpPr>
+      <p:grpSpPr>
+        <a:xfrm>
+          <a:off x="0" y="0"/>
+          <a:ext cx="0" cy="0"/>
+          <a:chOff x="0" y="0"/>
+          <a:chExt cx="0" cy="0"/>
+        </a:xfrm>
+      </p:grpSpPr>
+      <p:sp>
+        <p:nvSpPr>
+          <p:cNvPr id="2" name="Título 1"/>
+          <p:cNvSpPr>
+            <a:spLocks noGrp="1"/>
+          </p:cNvSpPr>
+          <p:nvPr>
+            <p:ph type="title"/>
+          </p:nvPr>
+        </p:nvSpPr>
+        <p:spPr/>
+        <p:txBody>
+          <a:bodyPr/>
+          <a:lstStyle/>
+          <a:p>
+            <a:r>
+              <a:rPr lang="es-ES" dirty="0" smtClean="0"/>
+              <a:t>Modelo conceptual</a:t>
+            </a:r>
+            <a:endParaRPr lang="es-ES" dirty="0"/>
+          </a:p>
+        </p:txBody>
+      </p:sp>
+      <p:pic>
+        <p:nvPicPr>
+          <p:cNvPr id="4" name="Marcador de contenido 3"/>
+          <p:cNvPicPr>
+            <a:picLocks noGrp="1" noChangeAspect="1"/>
+          </p:cNvPicPr>
+          <p:nvPr>
+            <p:ph idx="1"/>
+          </p:nvPr>
+        </p:nvPicPr>
+        <p:blipFill>
+          <a:blip r:embed="rId2">
+            <a:extLst>
+              <a:ext uri="{28A0092B-C50C-407E-A947-70E740481C1C}">
+                <a14:useLocalDpi xmlns:a14="http://schemas.microsoft.com/office/drawing/2010/main" val="0"/>
+              </a:ext>
+            </a:extLst>
+          </a:blip>
+          <a:stretch>
+            <a:fillRect/>
+          </a:stretch>
+        </p:blipFill>
+        <p:spPr>
+          <a:xfrm>
+            <a:off x="2313888" y="2359578"/>
+            <a:ext cx="8077022" cy="4237636"/>
+          </a:xfrm>
+        </p:spPr>
+      </p:pic>
+    </p:spTree>
+    <p:extLst>
+      <p:ext uri="{BB962C8B-B14F-4D97-AF65-F5344CB8AC3E}">
+        <p14:creationId xmlns:p14="http://schemas.microsoft.com/office/powerpoint/2010/main" val="1111755451"/>
+      </p:ext>
+    </p:extLst>
+  </p:cSld>
+  <p:clrMapOvr>
+    <a:masterClrMapping/>
+  </p:clrMapOvr>
+</p:sld>
+</file>
+
+<file path=ppt/slides/slide13.xml><?xml version="1.0" encoding="utf-8"?>
+<p:sld xmlns:a="http://schemas.openxmlformats.org/drawingml/2006/main" xmlns:r="http://schemas.openxmlformats.org/officeDocument/2006/relationships" xmlns:p="http://schemas.openxmlformats.org/presentationml/2006/main">
+  <p:cSld>
+    <p:spTree>
+      <p:nvGrpSpPr>
+        <p:cNvPr id="1" name=""/>
+        <p:cNvGrpSpPr/>
+        <p:nvPr/>
+      </p:nvGrpSpPr>
+      <p:grpSpPr>
+        <a:xfrm>
+          <a:off x="0" y="0"/>
+          <a:ext cx="0" cy="0"/>
+          <a:chOff x="0" y="0"/>
+          <a:chExt cx="0" cy="0"/>
+        </a:xfrm>
+      </p:grpSpPr>
+      <p:sp>
+        <p:nvSpPr>
+          <p:cNvPr id="2" name="Título 1"/>
+          <p:cNvSpPr>
+            <a:spLocks noGrp="1"/>
+          </p:cNvSpPr>
+          <p:nvPr>
+            <p:ph type="title"/>
+          </p:nvPr>
+        </p:nvSpPr>
+        <p:spPr/>
+        <p:txBody>
+          <a:bodyPr/>
+          <a:lstStyle/>
+          <a:p>
+            <a:r>
+              <a:rPr lang="es-ES" dirty="0" smtClean="0"/>
+              <a:t>Diagrama de casos de uso</a:t>
+            </a:r>
+            <a:endParaRPr lang="es-ES" dirty="0"/>
+          </a:p>
+        </p:txBody>
+      </p:sp>
+      <p:pic>
+        <p:nvPicPr>
+          <p:cNvPr id="4" name="Marcador de contenido 3" descr="C:\Users\ale\AppData\Local\Microsoft\Windows\INetCache\Content.Word\Captura de pantalla 2024-09-21 234518.png"/>
+          <p:cNvPicPr>
+            <a:picLocks noGrp="1"/>
+          </p:cNvPicPr>
+          <p:nvPr>
+            <p:ph idx="1"/>
+          </p:nvPr>
+        </p:nvPicPr>
+        <p:blipFill>
+          <a:blip r:embed="rId2">
+            <a:extLst>
+              <a:ext uri="{28A0092B-C50C-407E-A947-70E740481C1C}">
+                <a14:useLocalDpi xmlns:a14="http://schemas.microsoft.com/office/drawing/2010/main" val="0"/>
+              </a:ext>
+            </a:extLst>
+          </a:blip>
+          <a:srcRect/>
+          <a:stretch>
+            <a:fillRect/>
+          </a:stretch>
+        </p:blipFill>
+        <p:spPr bwMode="auto">
+          <a:xfrm>
+            <a:off x="3625171" y="2534193"/>
+            <a:ext cx="5414325" cy="3840481"/>
+          </a:xfrm>
+          <a:prstGeom prst="rect">
+            <a:avLst/>
+          </a:prstGeom>
+          <a:noFill/>
+          <a:ln>
+            <a:noFill/>
+          </a:ln>
+        </p:spPr>
+      </p:pic>
+    </p:spTree>
+    <p:extLst>
+      <p:ext uri="{BB962C8B-B14F-4D97-AF65-F5344CB8AC3E}">
+        <p14:creationId xmlns:p14="http://schemas.microsoft.com/office/powerpoint/2010/main" val="4097852041"/>
+      </p:ext>
+    </p:extLst>
+  </p:cSld>
+  <p:clrMapOvr>
+    <a:masterClrMapping/>
+  </p:clrMapOvr>
+</p:sld>
+</file>
+
+<file path=ppt/slides/slide14.xml><?xml version="1.0" encoding="utf-8"?>
+<p:sld xmlns:a="http://schemas.openxmlformats.org/drawingml/2006/main" xmlns:r="http://schemas.openxmlformats.org/officeDocument/2006/relationships" xmlns:p="http://schemas.openxmlformats.org/presentationml/2006/main">
+  <p:cSld>
+    <p:spTree>
+      <p:nvGrpSpPr>
+        <p:cNvPr id="1" name=""/>
+        <p:cNvGrpSpPr/>
+        <p:nvPr/>
+      </p:nvGrpSpPr>
+      <p:grpSpPr>
+        <a:xfrm>
+          <a:off x="0" y="0"/>
+          <a:ext cx="0" cy="0"/>
+          <a:chOff x="0" y="0"/>
+          <a:chExt cx="0" cy="0"/>
+        </a:xfrm>
+      </p:grpSpPr>
+      <p:sp>
+        <p:nvSpPr>
+          <p:cNvPr id="2" name="Título 1"/>
+          <p:cNvSpPr>
+            <a:spLocks noGrp="1"/>
+          </p:cNvSpPr>
+          <p:nvPr>
+            <p:ph type="title"/>
+          </p:nvPr>
+        </p:nvSpPr>
+        <p:spPr/>
+        <p:txBody>
+          <a:bodyPr/>
+          <a:lstStyle/>
+          <a:p>
+            <a:r>
+              <a:rPr lang="es-ES" dirty="0" smtClean="0"/>
+              <a:t>Modelado de datos</a:t>
+            </a:r>
+            <a:endParaRPr lang="es-ES" dirty="0"/>
+          </a:p>
+        </p:txBody>
+      </p:sp>
+      <p:pic>
+        <p:nvPicPr>
+          <p:cNvPr id="4" name="Imagen 3" descr="C:\Users\ale\AppData\Local\Microsoft\Windows\INetCache\Content.Word\Captura de pantalla 2024-09-22 000005.png"/>
+          <p:cNvPicPr/>
+          <p:nvPr/>
+        </p:nvPicPr>
+        <p:blipFill>
+          <a:blip r:embed="rId2" cstate="print">
+            <a:extLst>
+              <a:ext uri="{28A0092B-C50C-407E-A947-70E740481C1C}">
+                <a14:useLocalDpi xmlns:a14="http://schemas.microsoft.com/office/drawing/2010/main" val="0"/>
+              </a:ext>
+            </a:extLst>
+          </a:blip>
+          <a:srcRect/>
+          <a:stretch>
+            <a:fillRect/>
+          </a:stretch>
+        </p:blipFill>
+        <p:spPr bwMode="auto">
+          <a:xfrm>
+            <a:off x="2901338" y="2403566"/>
+            <a:ext cx="7278981" cy="3953691"/>
+          </a:xfrm>
+          <a:prstGeom prst="rect">
+            <a:avLst/>
+          </a:prstGeom>
+          <a:noFill/>
+          <a:ln>
+            <a:noFill/>
+          </a:ln>
+        </p:spPr>
+      </p:pic>
+    </p:spTree>
+    <p:extLst>
+      <p:ext uri="{BB962C8B-B14F-4D97-AF65-F5344CB8AC3E}">
+        <p14:creationId xmlns:p14="http://schemas.microsoft.com/office/powerpoint/2010/main" val="2505894896"/>
+      </p:ext>
+    </p:extLst>
+  </p:cSld>
+  <p:clrMapOvr>
+    <a:masterClrMapping/>
+  </p:clrMapOvr>
+</p:sld>
+</file>
+
+<file path=ppt/slides/slide15.xml><?xml version="1.0" encoding="utf-8"?>
+<p:sld xmlns:a="http://schemas.openxmlformats.org/drawingml/2006/main" xmlns:r="http://schemas.openxmlformats.org/officeDocument/2006/relationships" xmlns:p="http://schemas.openxmlformats.org/presentationml/2006/main">
+  <p:cSld>
+    <p:spTree>
+      <p:nvGrpSpPr>
+        <p:cNvPr id="1" name=""/>
+        <p:cNvGrpSpPr/>
+        <p:nvPr/>
+      </p:nvGrpSpPr>
+      <p:grpSpPr>
+        <a:xfrm>
+          <a:off x="0" y="0"/>
+          <a:ext cx="0" cy="0"/>
+          <a:chOff x="0" y="0"/>
+          <a:chExt cx="0" cy="0"/>
+        </a:xfrm>
+      </p:grpSpPr>
+      <p:sp>
+        <p:nvSpPr>
+          <p:cNvPr id="2" name="Título 1"/>
+          <p:cNvSpPr>
+            <a:spLocks noGrp="1"/>
+          </p:cNvSpPr>
+          <p:nvPr>
+            <p:ph type="title"/>
+          </p:nvPr>
+        </p:nvSpPr>
+        <p:spPr/>
+        <p:txBody>
+          <a:bodyPr/>
+          <a:lstStyle/>
+          <a:p>
+            <a:r>
+              <a:rPr lang="es-ES" dirty="0" smtClean="0"/>
+              <a:t>Requisitos Funcionales</a:t>
+            </a:r>
+            <a:endParaRPr lang="es-ES" dirty="0"/>
+          </a:p>
+        </p:txBody>
+      </p:sp>
+      <p:graphicFrame>
+        <p:nvGraphicFramePr>
+          <p:cNvPr id="3" name="Tabla 2"/>
+          <p:cNvGraphicFramePr>
+            <a:graphicFrameLocks noGrp="1"/>
+          </p:cNvGraphicFramePr>
+          <p:nvPr>
+            <p:extLst>
+              <p:ext uri="{D42A27DB-BD31-4B8C-83A1-F6EECF244321}">
+                <p14:modId xmlns:p14="http://schemas.microsoft.com/office/powerpoint/2010/main" val="2826540728"/>
+              </p:ext>
+            </p:extLst>
+          </p:nvPr>
+        </p:nvGraphicFramePr>
+        <p:xfrm>
+          <a:off x="2156691" y="2847724"/>
+          <a:ext cx="8128000" cy="3144520"/>
+        </p:xfrm>
+        <a:graphic>
+          <a:graphicData uri="http://schemas.openxmlformats.org/drawingml/2006/table">
+            <a:tbl>
+              <a:tblPr firstRow="1" bandRow="1">
+                <a:tableStyleId>{5C22544A-7EE6-4342-B048-85BDC9FD1C3A}</a:tableStyleId>
+              </a:tblPr>
+              <a:tblGrid>
+                <a:gridCol w="2032000"/>
+                <a:gridCol w="2032000"/>
+                <a:gridCol w="2032000"/>
+                <a:gridCol w="2032000"/>
+              </a:tblGrid>
+              <a:tr h="370840">
+                <a:tc>
+                  <a:txBody>
+                    <a:bodyPr/>
+                    <a:lstStyle/>
+                    <a:p>
+                      <a:pPr>
+                        <a:lnSpc>
+                          <a:spcPct val="150000"/>
+                        </a:lnSpc>
+                        <a:spcAft>
+                          <a:spcPts val="0"/>
+                        </a:spcAft>
+                      </a:pPr>
+                      <a:r>
+                        <a:rPr lang="es-ES" sz="1200" dirty="0">
+                          <a:effectLst/>
+                          <a:latin typeface="Arial" panose="020B0604020202020204" pitchFamily="34" charset="0"/>
+                          <a:ea typeface="Times New Roman" panose="02020603050405020304" pitchFamily="18" charset="0"/>
+                          <a:cs typeface="Times New Roman" panose="02020603050405020304" pitchFamily="18" charset="0"/>
+                        </a:rPr>
+                        <a:t>Requisitos Funcionales</a:t>
+                      </a:r>
+                      <a:endParaRPr lang="es-ES" sz="1200" dirty="0">
+                        <a:effectLst/>
+                        <a:latin typeface="Times New Roman" panose="02020603050405020304" pitchFamily="18" charset="0"/>
+                        <a:ea typeface="Times New Roman" panose="02020603050405020304" pitchFamily="18" charset="0"/>
+                        <a:cs typeface="Times New Roman" panose="02020603050405020304" pitchFamily="18" charset="0"/>
+                      </a:endParaRPr>
+                    </a:p>
+                  </a:txBody>
+                  <a:tcPr marL="68580" marR="68580" marT="0" marB="0"/>
+                </a:tc>
+                <a:tc>
+                  <a:txBody>
+                    <a:bodyPr/>
+                    <a:lstStyle/>
+                    <a:p>
+                      <a:pPr>
+                        <a:lnSpc>
+                          <a:spcPct val="150000"/>
+                        </a:lnSpc>
+                        <a:spcAft>
+                          <a:spcPts val="0"/>
+                        </a:spcAft>
+                      </a:pPr>
+                      <a:r>
+                        <a:rPr lang="es-ES" sz="1200">
+                          <a:effectLst/>
+                          <a:latin typeface="Arial" panose="020B0604020202020204" pitchFamily="34" charset="0"/>
+                          <a:ea typeface="Times New Roman" panose="02020603050405020304" pitchFamily="18" charset="0"/>
+                          <a:cs typeface="Times New Roman" panose="02020603050405020304" pitchFamily="18" charset="0"/>
+                        </a:rPr>
+                        <a:t>Nombre del requisito funcional</a:t>
+                      </a:r>
+                      <a:endParaRPr lang="es-ES" sz="1200">
+                        <a:effectLst/>
+                        <a:latin typeface="Times New Roman" panose="02020603050405020304" pitchFamily="18" charset="0"/>
+                        <a:ea typeface="Times New Roman" panose="02020603050405020304" pitchFamily="18" charset="0"/>
+                        <a:cs typeface="Times New Roman" panose="02020603050405020304" pitchFamily="18" charset="0"/>
+                      </a:endParaRPr>
+                    </a:p>
+                  </a:txBody>
+                  <a:tcPr marL="68580" marR="68580" marT="0" marB="0"/>
+                </a:tc>
+                <a:tc>
+                  <a:txBody>
+                    <a:bodyPr/>
+                    <a:lstStyle/>
+                    <a:p>
+                      <a:pPr>
+                        <a:lnSpc>
+                          <a:spcPct val="150000"/>
+                        </a:lnSpc>
+                        <a:spcAft>
+                          <a:spcPts val="0"/>
+                        </a:spcAft>
+                      </a:pPr>
+                      <a:r>
+                        <a:rPr lang="es-ES" sz="1200">
+                          <a:effectLst/>
+                          <a:latin typeface="Arial" panose="020B0604020202020204" pitchFamily="34" charset="0"/>
+                          <a:ea typeface="Times New Roman" panose="02020603050405020304" pitchFamily="18" charset="0"/>
+                          <a:cs typeface="Times New Roman" panose="02020603050405020304" pitchFamily="18" charset="0"/>
+                        </a:rPr>
+                        <a:t>Prioridad</a:t>
+                      </a:r>
+                      <a:endParaRPr lang="es-ES" sz="1200">
+                        <a:effectLst/>
+                        <a:latin typeface="Times New Roman" panose="02020603050405020304" pitchFamily="18" charset="0"/>
+                        <a:ea typeface="Times New Roman" panose="02020603050405020304" pitchFamily="18" charset="0"/>
+                        <a:cs typeface="Times New Roman" panose="02020603050405020304" pitchFamily="18" charset="0"/>
+                      </a:endParaRPr>
+                    </a:p>
+                  </a:txBody>
+                  <a:tcPr marL="68580" marR="68580" marT="0" marB="0"/>
+                </a:tc>
+                <a:tc>
+                  <a:txBody>
+                    <a:bodyPr/>
+                    <a:lstStyle/>
+                    <a:p>
+                      <a:pPr>
+                        <a:lnSpc>
+                          <a:spcPct val="150000"/>
+                        </a:lnSpc>
+                        <a:spcAft>
+                          <a:spcPts val="0"/>
+                        </a:spcAft>
+                      </a:pPr>
+                      <a:r>
+                        <a:rPr lang="es-ES" sz="1200">
+                          <a:effectLst/>
+                          <a:latin typeface="Arial" panose="020B0604020202020204" pitchFamily="34" charset="0"/>
+                          <a:ea typeface="Times New Roman" panose="02020603050405020304" pitchFamily="18" charset="0"/>
+                          <a:cs typeface="Times New Roman" panose="02020603050405020304" pitchFamily="18" charset="0"/>
+                        </a:rPr>
+                        <a:t>Complejidad</a:t>
+                      </a:r>
+                      <a:endParaRPr lang="es-ES" sz="1200">
+                        <a:effectLst/>
+                        <a:latin typeface="Times New Roman" panose="02020603050405020304" pitchFamily="18" charset="0"/>
+                        <a:ea typeface="Times New Roman" panose="02020603050405020304" pitchFamily="18" charset="0"/>
+                        <a:cs typeface="Times New Roman" panose="02020603050405020304" pitchFamily="18" charset="0"/>
+                      </a:endParaRPr>
+                    </a:p>
+                  </a:txBody>
+                  <a:tcPr marL="68580" marR="68580" marT="0" marB="0"/>
+                </a:tc>
+              </a:tr>
+              <a:tr h="370840">
+                <a:tc>
+                  <a:txBody>
+                    <a:bodyPr/>
+                    <a:lstStyle/>
+                    <a:p>
+                      <a:pPr algn="just">
+                        <a:spcAft>
+                          <a:spcPts val="0"/>
+                        </a:spcAft>
+                      </a:pPr>
+                      <a:r>
+                        <a:rPr lang="es-ES" sz="1200">
+                          <a:effectLst/>
+                          <a:latin typeface="Arial" panose="020B0604020202020204" pitchFamily="34" charset="0"/>
+                          <a:ea typeface="Times New Roman" panose="02020603050405020304" pitchFamily="18" charset="0"/>
+                          <a:cs typeface="Times New Roman" panose="02020603050405020304" pitchFamily="18" charset="0"/>
+                        </a:rPr>
+                        <a:t>RF1</a:t>
+                      </a:r>
+                      <a:endParaRPr lang="es-ES" sz="1200">
+                        <a:effectLst/>
+                        <a:latin typeface="Times New Roman" panose="02020603050405020304" pitchFamily="18" charset="0"/>
+                        <a:ea typeface="Times New Roman" panose="02020603050405020304" pitchFamily="18" charset="0"/>
+                        <a:cs typeface="Times New Roman" panose="02020603050405020304" pitchFamily="18" charset="0"/>
+                      </a:endParaRPr>
+                    </a:p>
+                  </a:txBody>
+                  <a:tcPr marL="68580" marR="68580" marT="0" marB="0"/>
+                </a:tc>
+                <a:tc>
+                  <a:txBody>
+                    <a:bodyPr/>
+                    <a:lstStyle/>
+                    <a:p>
+                      <a:pPr algn="just">
+                        <a:lnSpc>
+                          <a:spcPct val="150000"/>
+                        </a:lnSpc>
+                        <a:spcAft>
+                          <a:spcPts val="0"/>
+                        </a:spcAft>
+                      </a:pPr>
+                      <a:r>
+                        <a:rPr lang="es-ES" sz="1200">
+                          <a:effectLst/>
+                          <a:latin typeface="Arial" panose="020B0604020202020204" pitchFamily="34" charset="0"/>
+                          <a:ea typeface="Times New Roman" panose="02020603050405020304" pitchFamily="18" charset="0"/>
+                          <a:cs typeface="Times New Roman" panose="02020603050405020304" pitchFamily="18" charset="0"/>
+                        </a:rPr>
+                        <a:t>Entrenar</a:t>
+                      </a:r>
+                      <a:endParaRPr lang="es-ES" sz="1200">
+                        <a:effectLst/>
+                        <a:latin typeface="Times New Roman" panose="02020603050405020304" pitchFamily="18" charset="0"/>
+                        <a:ea typeface="Times New Roman" panose="02020603050405020304" pitchFamily="18" charset="0"/>
+                        <a:cs typeface="Times New Roman" panose="02020603050405020304" pitchFamily="18" charset="0"/>
+                      </a:endParaRPr>
+                    </a:p>
+                  </a:txBody>
+                  <a:tcPr marL="68580" marR="68580" marT="0" marB="0"/>
+                </a:tc>
+                <a:tc>
+                  <a:txBody>
+                    <a:bodyPr/>
+                    <a:lstStyle/>
+                    <a:p>
+                      <a:pPr algn="just">
+                        <a:spcAft>
+                          <a:spcPts val="0"/>
+                        </a:spcAft>
+                      </a:pPr>
+                      <a:r>
+                        <a:rPr lang="es-ES" sz="1200">
+                          <a:effectLst/>
+                          <a:latin typeface="Arial" panose="020B0604020202020204" pitchFamily="34" charset="0"/>
+                          <a:ea typeface="Times New Roman" panose="02020603050405020304" pitchFamily="18" charset="0"/>
+                          <a:cs typeface="Times New Roman" panose="02020603050405020304" pitchFamily="18" charset="0"/>
+                        </a:rPr>
+                        <a:t>Alta</a:t>
+                      </a:r>
+                      <a:endParaRPr lang="es-ES" sz="1200">
+                        <a:effectLst/>
+                        <a:latin typeface="Times New Roman" panose="02020603050405020304" pitchFamily="18" charset="0"/>
+                        <a:ea typeface="Times New Roman" panose="02020603050405020304" pitchFamily="18" charset="0"/>
+                        <a:cs typeface="Times New Roman" panose="02020603050405020304" pitchFamily="18" charset="0"/>
+                      </a:endParaRPr>
+                    </a:p>
+                  </a:txBody>
+                  <a:tcPr marL="68580" marR="68580" marT="0" marB="0"/>
+                </a:tc>
+                <a:tc>
+                  <a:txBody>
+                    <a:bodyPr/>
+                    <a:lstStyle/>
+                    <a:p>
+                      <a:pPr algn="just">
+                        <a:spcAft>
+                          <a:spcPts val="0"/>
+                        </a:spcAft>
+                      </a:pPr>
+                      <a:r>
+                        <a:rPr lang="es-ES" sz="1200">
+                          <a:effectLst/>
+                          <a:latin typeface="Arial" panose="020B0604020202020204" pitchFamily="34" charset="0"/>
+                          <a:ea typeface="Times New Roman" panose="02020603050405020304" pitchFamily="18" charset="0"/>
+                          <a:cs typeface="Times New Roman" panose="02020603050405020304" pitchFamily="18" charset="0"/>
+                        </a:rPr>
+                        <a:t>Alta</a:t>
+                      </a:r>
+                      <a:endParaRPr lang="es-ES" sz="1200">
+                        <a:effectLst/>
+                        <a:latin typeface="Times New Roman" panose="02020603050405020304" pitchFamily="18" charset="0"/>
+                        <a:ea typeface="Times New Roman" panose="02020603050405020304" pitchFamily="18" charset="0"/>
+                        <a:cs typeface="Times New Roman" panose="02020603050405020304" pitchFamily="18" charset="0"/>
+                      </a:endParaRPr>
+                    </a:p>
+                  </a:txBody>
+                  <a:tcPr marL="68580" marR="68580" marT="0" marB="0"/>
+                </a:tc>
+              </a:tr>
+              <a:tr h="370840">
+                <a:tc>
+                  <a:txBody>
+                    <a:bodyPr/>
+                    <a:lstStyle/>
+                    <a:p>
+                      <a:pPr algn="just">
+                        <a:spcAft>
+                          <a:spcPts val="0"/>
+                        </a:spcAft>
+                      </a:pPr>
+                      <a:r>
+                        <a:rPr lang="es-ES" sz="1200">
+                          <a:effectLst/>
+                          <a:latin typeface="Arial" panose="020B0604020202020204" pitchFamily="34" charset="0"/>
+                          <a:ea typeface="Times New Roman" panose="02020603050405020304" pitchFamily="18" charset="0"/>
+                          <a:cs typeface="Times New Roman" panose="02020603050405020304" pitchFamily="18" charset="0"/>
+                        </a:rPr>
+                        <a:t>RF2</a:t>
+                      </a:r>
+                      <a:endParaRPr lang="es-ES" sz="1200">
+                        <a:effectLst/>
+                        <a:latin typeface="Times New Roman" panose="02020603050405020304" pitchFamily="18" charset="0"/>
+                        <a:ea typeface="Times New Roman" panose="02020603050405020304" pitchFamily="18" charset="0"/>
+                        <a:cs typeface="Times New Roman" panose="02020603050405020304" pitchFamily="18" charset="0"/>
+                      </a:endParaRPr>
+                    </a:p>
+                  </a:txBody>
+                  <a:tcPr marL="68580" marR="68580" marT="0" marB="0"/>
+                </a:tc>
+                <a:tc>
+                  <a:txBody>
+                    <a:bodyPr/>
+                    <a:lstStyle/>
+                    <a:p>
+                      <a:pPr algn="just">
+                        <a:lnSpc>
+                          <a:spcPct val="150000"/>
+                        </a:lnSpc>
+                        <a:spcAft>
+                          <a:spcPts val="0"/>
+                        </a:spcAft>
+                      </a:pPr>
+                      <a:r>
+                        <a:rPr lang="es-ES" sz="1200">
+                          <a:effectLst/>
+                          <a:latin typeface="Arial" panose="020B0604020202020204" pitchFamily="34" charset="0"/>
+                          <a:ea typeface="Times New Roman" panose="02020603050405020304" pitchFamily="18" charset="0"/>
+                          <a:cs typeface="Times New Roman" panose="02020603050405020304" pitchFamily="18" charset="0"/>
+                        </a:rPr>
+                        <a:t>Actualizar</a:t>
+                      </a:r>
+                      <a:endParaRPr lang="es-ES" sz="1200">
+                        <a:effectLst/>
+                        <a:latin typeface="Times New Roman" panose="02020603050405020304" pitchFamily="18" charset="0"/>
+                        <a:ea typeface="Times New Roman" panose="02020603050405020304" pitchFamily="18" charset="0"/>
+                        <a:cs typeface="Times New Roman" panose="02020603050405020304" pitchFamily="18" charset="0"/>
+                      </a:endParaRPr>
+                    </a:p>
+                  </a:txBody>
+                  <a:tcPr marL="68580" marR="68580" marT="0" marB="0"/>
+                </a:tc>
+                <a:tc>
+                  <a:txBody>
+                    <a:bodyPr/>
+                    <a:lstStyle/>
+                    <a:p>
+                      <a:pPr algn="just">
+                        <a:spcAft>
+                          <a:spcPts val="0"/>
+                        </a:spcAft>
+                      </a:pPr>
+                      <a:r>
+                        <a:rPr lang="es-ES" sz="1200">
+                          <a:effectLst/>
+                          <a:latin typeface="Arial" panose="020B0604020202020204" pitchFamily="34" charset="0"/>
+                          <a:ea typeface="Times New Roman" panose="02020603050405020304" pitchFamily="18" charset="0"/>
+                          <a:cs typeface="Times New Roman" panose="02020603050405020304" pitchFamily="18" charset="0"/>
+                        </a:rPr>
+                        <a:t>Alta</a:t>
+                      </a:r>
+                      <a:endParaRPr lang="es-ES" sz="1200">
+                        <a:effectLst/>
+                        <a:latin typeface="Times New Roman" panose="02020603050405020304" pitchFamily="18" charset="0"/>
+                        <a:ea typeface="Times New Roman" panose="02020603050405020304" pitchFamily="18" charset="0"/>
+                        <a:cs typeface="Times New Roman" panose="02020603050405020304" pitchFamily="18" charset="0"/>
+                      </a:endParaRPr>
+                    </a:p>
+                  </a:txBody>
+                  <a:tcPr marL="68580" marR="68580" marT="0" marB="0"/>
+                </a:tc>
+                <a:tc>
+                  <a:txBody>
+                    <a:bodyPr/>
+                    <a:lstStyle/>
+                    <a:p>
+                      <a:pPr algn="just">
+                        <a:spcAft>
+                          <a:spcPts val="0"/>
+                        </a:spcAft>
+                      </a:pPr>
+                      <a:r>
+                        <a:rPr lang="es-ES" sz="1200">
+                          <a:effectLst/>
+                          <a:latin typeface="Arial" panose="020B0604020202020204" pitchFamily="34" charset="0"/>
+                          <a:ea typeface="Times New Roman" panose="02020603050405020304" pitchFamily="18" charset="0"/>
+                          <a:cs typeface="Times New Roman" panose="02020603050405020304" pitchFamily="18" charset="0"/>
+                        </a:rPr>
+                        <a:t>Alta</a:t>
+                      </a:r>
+                      <a:endParaRPr lang="es-ES" sz="1200">
+                        <a:effectLst/>
+                        <a:latin typeface="Times New Roman" panose="02020603050405020304" pitchFamily="18" charset="0"/>
+                        <a:ea typeface="Times New Roman" panose="02020603050405020304" pitchFamily="18" charset="0"/>
+                        <a:cs typeface="Times New Roman" panose="02020603050405020304" pitchFamily="18" charset="0"/>
+                      </a:endParaRPr>
+                    </a:p>
+                  </a:txBody>
+                  <a:tcPr marL="68580" marR="68580" marT="0" marB="0"/>
+                </a:tc>
+              </a:tr>
+              <a:tr h="370840">
+                <a:tc>
+                  <a:txBody>
+                    <a:bodyPr/>
+                    <a:lstStyle/>
+                    <a:p>
+                      <a:pPr algn="just">
+                        <a:spcAft>
+                          <a:spcPts val="0"/>
+                        </a:spcAft>
+                      </a:pPr>
+                      <a:r>
+                        <a:rPr lang="es-ES" sz="1200">
+                          <a:effectLst/>
+                          <a:latin typeface="Arial" panose="020B0604020202020204" pitchFamily="34" charset="0"/>
+                          <a:ea typeface="Times New Roman" panose="02020603050405020304" pitchFamily="18" charset="0"/>
+                          <a:cs typeface="Times New Roman" panose="02020603050405020304" pitchFamily="18" charset="0"/>
+                        </a:rPr>
+                        <a:t>RF3</a:t>
+                      </a:r>
+                      <a:endParaRPr lang="es-ES" sz="1200">
+                        <a:effectLst/>
+                        <a:latin typeface="Times New Roman" panose="02020603050405020304" pitchFamily="18" charset="0"/>
+                        <a:ea typeface="Times New Roman" panose="02020603050405020304" pitchFamily="18" charset="0"/>
+                        <a:cs typeface="Times New Roman" panose="02020603050405020304" pitchFamily="18" charset="0"/>
+                      </a:endParaRPr>
+                    </a:p>
+                  </a:txBody>
+                  <a:tcPr marL="68580" marR="68580" marT="0" marB="0"/>
+                </a:tc>
+                <a:tc>
+                  <a:txBody>
+                    <a:bodyPr/>
+                    <a:lstStyle/>
+                    <a:p>
+                      <a:pPr algn="just">
+                        <a:lnSpc>
+                          <a:spcPct val="150000"/>
+                        </a:lnSpc>
+                        <a:spcAft>
+                          <a:spcPts val="0"/>
+                        </a:spcAft>
+                      </a:pPr>
+                      <a:r>
+                        <a:rPr lang="es-ES" sz="1200">
+                          <a:effectLst/>
+                          <a:latin typeface="Arial" panose="020B0604020202020204" pitchFamily="34" charset="0"/>
+                          <a:ea typeface="Times New Roman" panose="02020603050405020304" pitchFamily="18" charset="0"/>
+                          <a:cs typeface="Times New Roman" panose="02020603050405020304" pitchFamily="18" charset="0"/>
+                        </a:rPr>
+                        <a:t>Recomendar</a:t>
+                      </a:r>
+                      <a:endParaRPr lang="es-ES" sz="1200">
+                        <a:effectLst/>
+                        <a:latin typeface="Times New Roman" panose="02020603050405020304" pitchFamily="18" charset="0"/>
+                        <a:ea typeface="Times New Roman" panose="02020603050405020304" pitchFamily="18" charset="0"/>
+                        <a:cs typeface="Times New Roman" panose="02020603050405020304" pitchFamily="18" charset="0"/>
+                      </a:endParaRPr>
+                    </a:p>
+                  </a:txBody>
+                  <a:tcPr marL="68580" marR="68580" marT="0" marB="0"/>
+                </a:tc>
+                <a:tc>
+                  <a:txBody>
+                    <a:bodyPr/>
+                    <a:lstStyle/>
+                    <a:p>
+                      <a:pPr algn="just">
+                        <a:spcAft>
+                          <a:spcPts val="0"/>
+                        </a:spcAft>
+                      </a:pPr>
+                      <a:r>
+                        <a:rPr lang="es-ES" sz="1200">
+                          <a:effectLst/>
+                          <a:latin typeface="Arial" panose="020B0604020202020204" pitchFamily="34" charset="0"/>
+                          <a:ea typeface="Times New Roman" panose="02020603050405020304" pitchFamily="18" charset="0"/>
+                          <a:cs typeface="Times New Roman" panose="02020603050405020304" pitchFamily="18" charset="0"/>
+                        </a:rPr>
+                        <a:t>Alta</a:t>
+                      </a:r>
+                      <a:endParaRPr lang="es-ES" sz="1200">
+                        <a:effectLst/>
+                        <a:latin typeface="Times New Roman" panose="02020603050405020304" pitchFamily="18" charset="0"/>
+                        <a:ea typeface="Times New Roman" panose="02020603050405020304" pitchFamily="18" charset="0"/>
+                        <a:cs typeface="Times New Roman" panose="02020603050405020304" pitchFamily="18" charset="0"/>
+                      </a:endParaRPr>
+                    </a:p>
+                  </a:txBody>
+                  <a:tcPr marL="68580" marR="68580" marT="0" marB="0"/>
+                </a:tc>
+                <a:tc>
+                  <a:txBody>
+                    <a:bodyPr/>
+                    <a:lstStyle/>
+                    <a:p>
+                      <a:pPr algn="just">
+                        <a:spcAft>
+                          <a:spcPts val="0"/>
+                        </a:spcAft>
+                      </a:pPr>
+                      <a:r>
+                        <a:rPr lang="es-ES" sz="1200">
+                          <a:effectLst/>
+                          <a:latin typeface="Arial" panose="020B0604020202020204" pitchFamily="34" charset="0"/>
+                          <a:ea typeface="Times New Roman" panose="02020603050405020304" pitchFamily="18" charset="0"/>
+                          <a:cs typeface="Times New Roman" panose="02020603050405020304" pitchFamily="18" charset="0"/>
+                        </a:rPr>
+                        <a:t>Media</a:t>
+                      </a:r>
+                      <a:endParaRPr lang="es-ES" sz="1200">
+                        <a:effectLst/>
+                        <a:latin typeface="Times New Roman" panose="02020603050405020304" pitchFamily="18" charset="0"/>
+                        <a:ea typeface="Times New Roman" panose="02020603050405020304" pitchFamily="18" charset="0"/>
+                        <a:cs typeface="Times New Roman" panose="02020603050405020304" pitchFamily="18" charset="0"/>
+                      </a:endParaRPr>
+                    </a:p>
+                  </a:txBody>
+                  <a:tcPr marL="68580" marR="68580" marT="0" marB="0"/>
+                </a:tc>
+              </a:tr>
+              <a:tr h="370840">
+                <a:tc>
+                  <a:txBody>
+                    <a:bodyPr/>
+                    <a:lstStyle/>
+                    <a:p>
+                      <a:pPr algn="just">
+                        <a:spcAft>
+                          <a:spcPts val="0"/>
+                        </a:spcAft>
+                      </a:pPr>
+                      <a:r>
+                        <a:rPr lang="es-ES" sz="1200">
+                          <a:effectLst/>
+                          <a:latin typeface="Arial" panose="020B0604020202020204" pitchFamily="34" charset="0"/>
+                          <a:ea typeface="Times New Roman" panose="02020603050405020304" pitchFamily="18" charset="0"/>
+                          <a:cs typeface="Times New Roman" panose="02020603050405020304" pitchFamily="18" charset="0"/>
+                        </a:rPr>
+                        <a:t>RF4</a:t>
+                      </a:r>
+                      <a:endParaRPr lang="es-ES" sz="1200">
+                        <a:effectLst/>
+                        <a:latin typeface="Times New Roman" panose="02020603050405020304" pitchFamily="18" charset="0"/>
+                        <a:ea typeface="Times New Roman" panose="02020603050405020304" pitchFamily="18" charset="0"/>
+                        <a:cs typeface="Times New Roman" panose="02020603050405020304" pitchFamily="18" charset="0"/>
+                      </a:endParaRPr>
+                    </a:p>
+                  </a:txBody>
+                  <a:tcPr marL="68580" marR="68580" marT="0" marB="0"/>
+                </a:tc>
+                <a:tc>
+                  <a:txBody>
+                    <a:bodyPr/>
+                    <a:lstStyle/>
+                    <a:p>
+                      <a:pPr algn="just">
+                        <a:lnSpc>
+                          <a:spcPct val="150000"/>
+                        </a:lnSpc>
+                        <a:spcAft>
+                          <a:spcPts val="0"/>
+                        </a:spcAft>
+                      </a:pPr>
+                      <a:r>
+                        <a:rPr lang="es-ES" sz="1200">
+                          <a:effectLst/>
+                          <a:latin typeface="Arial" panose="020B0604020202020204" pitchFamily="34" charset="0"/>
+                          <a:ea typeface="Times New Roman" panose="02020603050405020304" pitchFamily="18" charset="0"/>
+                          <a:cs typeface="Times New Roman" panose="02020603050405020304" pitchFamily="18" charset="0"/>
+                        </a:rPr>
+                        <a:t>Crear Configuraciones</a:t>
+                      </a:r>
+                      <a:endParaRPr lang="es-ES" sz="1200">
+                        <a:effectLst/>
+                        <a:latin typeface="Times New Roman" panose="02020603050405020304" pitchFamily="18" charset="0"/>
+                        <a:ea typeface="Times New Roman" panose="02020603050405020304" pitchFamily="18" charset="0"/>
+                        <a:cs typeface="Times New Roman" panose="02020603050405020304" pitchFamily="18" charset="0"/>
+                      </a:endParaRPr>
+                    </a:p>
+                  </a:txBody>
+                  <a:tcPr marL="68580" marR="68580" marT="0" marB="0"/>
+                </a:tc>
+                <a:tc>
+                  <a:txBody>
+                    <a:bodyPr/>
+                    <a:lstStyle/>
+                    <a:p>
+                      <a:pPr algn="just">
+                        <a:spcAft>
+                          <a:spcPts val="0"/>
+                        </a:spcAft>
+                      </a:pPr>
+                      <a:r>
+                        <a:rPr lang="es-ES" sz="1200">
+                          <a:effectLst/>
+                          <a:latin typeface="Arial" panose="020B0604020202020204" pitchFamily="34" charset="0"/>
+                          <a:ea typeface="Times New Roman" panose="02020603050405020304" pitchFamily="18" charset="0"/>
+                          <a:cs typeface="Times New Roman" panose="02020603050405020304" pitchFamily="18" charset="0"/>
+                        </a:rPr>
+                        <a:t>Alta</a:t>
+                      </a:r>
+                      <a:endParaRPr lang="es-ES" sz="1200">
+                        <a:effectLst/>
+                        <a:latin typeface="Times New Roman" panose="02020603050405020304" pitchFamily="18" charset="0"/>
+                        <a:ea typeface="Times New Roman" panose="02020603050405020304" pitchFamily="18" charset="0"/>
+                        <a:cs typeface="Times New Roman" panose="02020603050405020304" pitchFamily="18" charset="0"/>
+                      </a:endParaRPr>
+                    </a:p>
+                  </a:txBody>
+                  <a:tcPr marL="68580" marR="68580" marT="0" marB="0"/>
+                </a:tc>
+                <a:tc>
+                  <a:txBody>
+                    <a:bodyPr/>
+                    <a:lstStyle/>
+                    <a:p>
+                      <a:pPr algn="just">
+                        <a:spcAft>
+                          <a:spcPts val="0"/>
+                        </a:spcAft>
+                      </a:pPr>
+                      <a:r>
+                        <a:rPr lang="es-ES" sz="1200">
+                          <a:effectLst/>
+                          <a:latin typeface="Arial" panose="020B0604020202020204" pitchFamily="34" charset="0"/>
+                          <a:ea typeface="Times New Roman" panose="02020603050405020304" pitchFamily="18" charset="0"/>
+                          <a:cs typeface="Times New Roman" panose="02020603050405020304" pitchFamily="18" charset="0"/>
+                        </a:rPr>
+                        <a:t>Media</a:t>
+                      </a:r>
+                      <a:endParaRPr lang="es-ES" sz="1200">
+                        <a:effectLst/>
+                        <a:latin typeface="Times New Roman" panose="02020603050405020304" pitchFamily="18" charset="0"/>
+                        <a:ea typeface="Times New Roman" panose="02020603050405020304" pitchFamily="18" charset="0"/>
+                        <a:cs typeface="Times New Roman" panose="02020603050405020304" pitchFamily="18" charset="0"/>
+                      </a:endParaRPr>
+                    </a:p>
+                  </a:txBody>
+                  <a:tcPr marL="68580" marR="68580" marT="0" marB="0"/>
+                </a:tc>
+              </a:tr>
+              <a:tr h="370840">
+                <a:tc>
+                  <a:txBody>
+                    <a:bodyPr/>
+                    <a:lstStyle/>
+                    <a:p>
+                      <a:pPr algn="just">
+                        <a:spcAft>
+                          <a:spcPts val="0"/>
+                        </a:spcAft>
+                      </a:pPr>
+                      <a:r>
+                        <a:rPr lang="es-ES" sz="1200">
+                          <a:effectLst/>
+                          <a:latin typeface="Arial" panose="020B0604020202020204" pitchFamily="34" charset="0"/>
+                          <a:ea typeface="Times New Roman" panose="02020603050405020304" pitchFamily="18" charset="0"/>
+                          <a:cs typeface="Times New Roman" panose="02020603050405020304" pitchFamily="18" charset="0"/>
+                        </a:rPr>
+                        <a:t>RF5</a:t>
+                      </a:r>
+                      <a:endParaRPr lang="es-ES" sz="1200">
+                        <a:effectLst/>
+                        <a:latin typeface="Times New Roman" panose="02020603050405020304" pitchFamily="18" charset="0"/>
+                        <a:ea typeface="Times New Roman" panose="02020603050405020304" pitchFamily="18" charset="0"/>
+                        <a:cs typeface="Times New Roman" panose="02020603050405020304" pitchFamily="18" charset="0"/>
+                      </a:endParaRPr>
+                    </a:p>
+                  </a:txBody>
+                  <a:tcPr marL="68580" marR="68580" marT="0" marB="0"/>
+                </a:tc>
+                <a:tc>
+                  <a:txBody>
+                    <a:bodyPr/>
+                    <a:lstStyle/>
+                    <a:p>
+                      <a:pPr algn="just">
+                        <a:lnSpc>
+                          <a:spcPct val="150000"/>
+                        </a:lnSpc>
+                        <a:spcAft>
+                          <a:spcPts val="0"/>
+                        </a:spcAft>
+                      </a:pPr>
+                      <a:r>
+                        <a:rPr lang="es-ES" sz="1200">
+                          <a:effectLst/>
+                          <a:latin typeface="Arial" panose="020B0604020202020204" pitchFamily="34" charset="0"/>
+                          <a:ea typeface="Times New Roman" panose="02020603050405020304" pitchFamily="18" charset="0"/>
+                          <a:cs typeface="Times New Roman" panose="02020603050405020304" pitchFamily="18" charset="0"/>
+                        </a:rPr>
+                        <a:t>Actualizar Configuraciones</a:t>
+                      </a:r>
+                      <a:endParaRPr lang="es-ES" sz="1200">
+                        <a:effectLst/>
+                        <a:latin typeface="Times New Roman" panose="02020603050405020304" pitchFamily="18" charset="0"/>
+                        <a:ea typeface="Times New Roman" panose="02020603050405020304" pitchFamily="18" charset="0"/>
+                        <a:cs typeface="Times New Roman" panose="02020603050405020304" pitchFamily="18" charset="0"/>
+                      </a:endParaRPr>
+                    </a:p>
+                  </a:txBody>
+                  <a:tcPr marL="68580" marR="68580" marT="0" marB="0"/>
+                </a:tc>
+                <a:tc>
+                  <a:txBody>
+                    <a:bodyPr/>
+                    <a:lstStyle/>
+                    <a:p>
+                      <a:pPr algn="just">
+                        <a:spcAft>
+                          <a:spcPts val="0"/>
+                        </a:spcAft>
+                      </a:pPr>
+                      <a:r>
+                        <a:rPr lang="es-ES" sz="1200">
+                          <a:effectLst/>
+                          <a:latin typeface="Arial" panose="020B0604020202020204" pitchFamily="34" charset="0"/>
+                          <a:ea typeface="Times New Roman" panose="02020603050405020304" pitchFamily="18" charset="0"/>
+                          <a:cs typeface="Times New Roman" panose="02020603050405020304" pitchFamily="18" charset="0"/>
+                        </a:rPr>
+                        <a:t>Media</a:t>
+                      </a:r>
+                      <a:endParaRPr lang="es-ES" sz="1200">
+                        <a:effectLst/>
+                        <a:latin typeface="Times New Roman" panose="02020603050405020304" pitchFamily="18" charset="0"/>
+                        <a:ea typeface="Times New Roman" panose="02020603050405020304" pitchFamily="18" charset="0"/>
+                        <a:cs typeface="Times New Roman" panose="02020603050405020304" pitchFamily="18" charset="0"/>
+                      </a:endParaRPr>
+                    </a:p>
+                  </a:txBody>
+                  <a:tcPr marL="68580" marR="68580" marT="0" marB="0"/>
+                </a:tc>
+                <a:tc>
+                  <a:txBody>
+                    <a:bodyPr/>
+                    <a:lstStyle/>
+                    <a:p>
+                      <a:pPr algn="just">
+                        <a:spcAft>
+                          <a:spcPts val="0"/>
+                        </a:spcAft>
+                      </a:pPr>
+                      <a:r>
+                        <a:rPr lang="es-ES" sz="1200">
+                          <a:effectLst/>
+                          <a:latin typeface="Arial" panose="020B0604020202020204" pitchFamily="34" charset="0"/>
+                          <a:ea typeface="Times New Roman" panose="02020603050405020304" pitchFamily="18" charset="0"/>
+                          <a:cs typeface="Times New Roman" panose="02020603050405020304" pitchFamily="18" charset="0"/>
+                        </a:rPr>
+                        <a:t>Media</a:t>
+                      </a:r>
+                      <a:endParaRPr lang="es-ES" sz="1200">
+                        <a:effectLst/>
+                        <a:latin typeface="Times New Roman" panose="02020603050405020304" pitchFamily="18" charset="0"/>
+                        <a:ea typeface="Times New Roman" panose="02020603050405020304" pitchFamily="18" charset="0"/>
+                        <a:cs typeface="Times New Roman" panose="02020603050405020304" pitchFamily="18" charset="0"/>
+                      </a:endParaRPr>
+                    </a:p>
+                  </a:txBody>
+                  <a:tcPr marL="68580" marR="68580" marT="0" marB="0"/>
+                </a:tc>
+              </a:tr>
+              <a:tr h="370840">
+                <a:tc>
+                  <a:txBody>
+                    <a:bodyPr/>
+                    <a:lstStyle/>
+                    <a:p>
+                      <a:pPr algn="just">
+                        <a:spcAft>
+                          <a:spcPts val="0"/>
+                        </a:spcAft>
+                      </a:pPr>
+                      <a:r>
+                        <a:rPr lang="es-ES" sz="1200">
+                          <a:effectLst/>
+                          <a:latin typeface="Arial" panose="020B0604020202020204" pitchFamily="34" charset="0"/>
+                          <a:ea typeface="Times New Roman" panose="02020603050405020304" pitchFamily="18" charset="0"/>
+                          <a:cs typeface="Times New Roman" panose="02020603050405020304" pitchFamily="18" charset="0"/>
+                        </a:rPr>
+                        <a:t>RF6</a:t>
+                      </a:r>
+                      <a:endParaRPr lang="es-ES" sz="1200">
+                        <a:effectLst/>
+                        <a:latin typeface="Times New Roman" panose="02020603050405020304" pitchFamily="18" charset="0"/>
+                        <a:ea typeface="Times New Roman" panose="02020603050405020304" pitchFamily="18" charset="0"/>
+                        <a:cs typeface="Times New Roman" panose="02020603050405020304" pitchFamily="18" charset="0"/>
+                      </a:endParaRPr>
+                    </a:p>
+                  </a:txBody>
+                  <a:tcPr marL="68580" marR="68580" marT="0" marB="0"/>
+                </a:tc>
+                <a:tc>
+                  <a:txBody>
+                    <a:bodyPr/>
+                    <a:lstStyle/>
+                    <a:p>
+                      <a:pPr algn="just">
+                        <a:lnSpc>
+                          <a:spcPct val="150000"/>
+                        </a:lnSpc>
+                        <a:spcAft>
+                          <a:spcPts val="0"/>
+                        </a:spcAft>
+                      </a:pPr>
+                      <a:r>
+                        <a:rPr lang="es-ES" sz="1200">
+                          <a:effectLst/>
+                          <a:latin typeface="Arial" panose="020B0604020202020204" pitchFamily="34" charset="0"/>
+                          <a:ea typeface="Times New Roman" panose="02020603050405020304" pitchFamily="18" charset="0"/>
+                          <a:cs typeface="Times New Roman" panose="02020603050405020304" pitchFamily="18" charset="0"/>
+                        </a:rPr>
+                        <a:t>Mostrar Configuraciones</a:t>
+                      </a:r>
+                      <a:endParaRPr lang="es-ES" sz="1200">
+                        <a:effectLst/>
+                        <a:latin typeface="Times New Roman" panose="02020603050405020304" pitchFamily="18" charset="0"/>
+                        <a:ea typeface="Times New Roman" panose="02020603050405020304" pitchFamily="18" charset="0"/>
+                        <a:cs typeface="Times New Roman" panose="02020603050405020304" pitchFamily="18" charset="0"/>
+                      </a:endParaRPr>
+                    </a:p>
+                  </a:txBody>
+                  <a:tcPr marL="68580" marR="68580" marT="0" marB="0"/>
+                </a:tc>
+                <a:tc>
+                  <a:txBody>
+                    <a:bodyPr/>
+                    <a:lstStyle/>
+                    <a:p>
+                      <a:pPr algn="just">
+                        <a:spcAft>
+                          <a:spcPts val="0"/>
+                        </a:spcAft>
+                      </a:pPr>
+                      <a:r>
+                        <a:rPr lang="es-ES" sz="1200">
+                          <a:effectLst/>
+                          <a:latin typeface="Arial" panose="020B0604020202020204" pitchFamily="34" charset="0"/>
+                          <a:ea typeface="Times New Roman" panose="02020603050405020304" pitchFamily="18" charset="0"/>
+                          <a:cs typeface="Times New Roman" panose="02020603050405020304" pitchFamily="18" charset="0"/>
+                        </a:rPr>
+                        <a:t>Alta</a:t>
+                      </a:r>
+                      <a:endParaRPr lang="es-ES" sz="1200">
+                        <a:effectLst/>
+                        <a:latin typeface="Times New Roman" panose="02020603050405020304" pitchFamily="18" charset="0"/>
+                        <a:ea typeface="Times New Roman" panose="02020603050405020304" pitchFamily="18" charset="0"/>
+                        <a:cs typeface="Times New Roman" panose="02020603050405020304" pitchFamily="18" charset="0"/>
+                      </a:endParaRPr>
+                    </a:p>
+                  </a:txBody>
+                  <a:tcPr marL="68580" marR="68580" marT="0" marB="0"/>
+                </a:tc>
+                <a:tc>
+                  <a:txBody>
+                    <a:bodyPr/>
+                    <a:lstStyle/>
+                    <a:p>
+                      <a:pPr algn="just">
+                        <a:spcAft>
+                          <a:spcPts val="0"/>
+                        </a:spcAft>
+                      </a:pPr>
+                      <a:r>
+                        <a:rPr lang="es-ES" sz="1200">
+                          <a:effectLst/>
+                          <a:latin typeface="Arial" panose="020B0604020202020204" pitchFamily="34" charset="0"/>
+                          <a:ea typeface="Times New Roman" panose="02020603050405020304" pitchFamily="18" charset="0"/>
+                          <a:cs typeface="Times New Roman" panose="02020603050405020304" pitchFamily="18" charset="0"/>
+                        </a:rPr>
+                        <a:t>Baja</a:t>
+                      </a:r>
+                      <a:endParaRPr lang="es-ES" sz="1200">
+                        <a:effectLst/>
+                        <a:latin typeface="Times New Roman" panose="02020603050405020304" pitchFamily="18" charset="0"/>
+                        <a:ea typeface="Times New Roman" panose="02020603050405020304" pitchFamily="18" charset="0"/>
+                        <a:cs typeface="Times New Roman" panose="02020603050405020304" pitchFamily="18" charset="0"/>
+                      </a:endParaRPr>
+                    </a:p>
+                  </a:txBody>
+                  <a:tcPr marL="68580" marR="68580" marT="0" marB="0"/>
+                </a:tc>
+              </a:tr>
+              <a:tr h="370840">
+                <a:tc>
+                  <a:txBody>
+                    <a:bodyPr/>
+                    <a:lstStyle/>
+                    <a:p>
+                      <a:pPr algn="just">
+                        <a:spcAft>
+                          <a:spcPts val="0"/>
+                        </a:spcAft>
+                      </a:pPr>
+                      <a:r>
+                        <a:rPr lang="es-ES" sz="1200">
+                          <a:effectLst/>
+                          <a:latin typeface="Arial" panose="020B0604020202020204" pitchFamily="34" charset="0"/>
+                          <a:ea typeface="Times New Roman" panose="02020603050405020304" pitchFamily="18" charset="0"/>
+                          <a:cs typeface="Times New Roman" panose="02020603050405020304" pitchFamily="18" charset="0"/>
+                        </a:rPr>
+                        <a:t>RF7</a:t>
+                      </a:r>
+                      <a:endParaRPr lang="es-ES" sz="1200">
+                        <a:effectLst/>
+                        <a:latin typeface="Times New Roman" panose="02020603050405020304" pitchFamily="18" charset="0"/>
+                        <a:ea typeface="Times New Roman" panose="02020603050405020304" pitchFamily="18" charset="0"/>
+                        <a:cs typeface="Times New Roman" panose="02020603050405020304" pitchFamily="18" charset="0"/>
+                      </a:endParaRPr>
+                    </a:p>
+                  </a:txBody>
+                  <a:tcPr marL="68580" marR="68580" marT="0" marB="0"/>
+                </a:tc>
+                <a:tc>
+                  <a:txBody>
+                    <a:bodyPr/>
+                    <a:lstStyle/>
+                    <a:p>
+                      <a:pPr algn="just">
+                        <a:lnSpc>
+                          <a:spcPct val="150000"/>
+                        </a:lnSpc>
+                        <a:spcAft>
+                          <a:spcPts val="0"/>
+                        </a:spcAft>
+                      </a:pPr>
+                      <a:r>
+                        <a:rPr lang="es-ES" sz="1200">
+                          <a:effectLst/>
+                          <a:latin typeface="Arial" panose="020B0604020202020204" pitchFamily="34" charset="0"/>
+                          <a:ea typeface="Times New Roman" panose="02020603050405020304" pitchFamily="18" charset="0"/>
+                          <a:cs typeface="Times New Roman" panose="02020603050405020304" pitchFamily="18" charset="0"/>
+                        </a:rPr>
+                        <a:t>Listar Configuraciones</a:t>
+                      </a:r>
+                      <a:endParaRPr lang="es-ES" sz="1200">
+                        <a:effectLst/>
+                        <a:latin typeface="Times New Roman" panose="02020603050405020304" pitchFamily="18" charset="0"/>
+                        <a:ea typeface="Times New Roman" panose="02020603050405020304" pitchFamily="18" charset="0"/>
+                        <a:cs typeface="Times New Roman" panose="02020603050405020304" pitchFamily="18" charset="0"/>
+                      </a:endParaRPr>
+                    </a:p>
+                  </a:txBody>
+                  <a:tcPr marL="68580" marR="68580" marT="0" marB="0"/>
+                </a:tc>
+                <a:tc>
+                  <a:txBody>
+                    <a:bodyPr/>
+                    <a:lstStyle/>
+                    <a:p>
+                      <a:pPr algn="just">
+                        <a:spcAft>
+                          <a:spcPts val="0"/>
+                        </a:spcAft>
+                      </a:pPr>
+                      <a:r>
+                        <a:rPr lang="es-ES" sz="1200">
+                          <a:effectLst/>
+                          <a:latin typeface="Arial" panose="020B0604020202020204" pitchFamily="34" charset="0"/>
+                          <a:ea typeface="Times New Roman" panose="02020603050405020304" pitchFamily="18" charset="0"/>
+                          <a:cs typeface="Times New Roman" panose="02020603050405020304" pitchFamily="18" charset="0"/>
+                        </a:rPr>
+                        <a:t>Baja</a:t>
+                      </a:r>
+                      <a:endParaRPr lang="es-ES" sz="1200">
+                        <a:effectLst/>
+                        <a:latin typeface="Times New Roman" panose="02020603050405020304" pitchFamily="18" charset="0"/>
+                        <a:ea typeface="Times New Roman" panose="02020603050405020304" pitchFamily="18" charset="0"/>
+                        <a:cs typeface="Times New Roman" panose="02020603050405020304" pitchFamily="18" charset="0"/>
+                      </a:endParaRPr>
+                    </a:p>
+                  </a:txBody>
+                  <a:tcPr marL="68580" marR="68580" marT="0" marB="0"/>
+                </a:tc>
+                <a:tc>
+                  <a:txBody>
+                    <a:bodyPr/>
+                    <a:lstStyle/>
+                    <a:p>
+                      <a:pPr algn="just">
+                        <a:spcAft>
+                          <a:spcPts val="0"/>
+                        </a:spcAft>
+                      </a:pPr>
+                      <a:r>
+                        <a:rPr lang="es-ES" sz="1200" dirty="0">
+                          <a:effectLst/>
+                          <a:latin typeface="Arial" panose="020B0604020202020204" pitchFamily="34" charset="0"/>
+                          <a:ea typeface="Times New Roman" panose="02020603050405020304" pitchFamily="18" charset="0"/>
+                          <a:cs typeface="Times New Roman" panose="02020603050405020304" pitchFamily="18" charset="0"/>
+                        </a:rPr>
+                        <a:t>Baja</a:t>
+                      </a:r>
+                      <a:endParaRPr lang="es-ES" sz="1200" dirty="0">
+                        <a:effectLst/>
+                        <a:latin typeface="Times New Roman" panose="02020603050405020304" pitchFamily="18" charset="0"/>
+                        <a:ea typeface="Times New Roman" panose="02020603050405020304" pitchFamily="18" charset="0"/>
+                        <a:cs typeface="Times New Roman" panose="02020603050405020304" pitchFamily="18" charset="0"/>
+                      </a:endParaRPr>
+                    </a:p>
+                  </a:txBody>
+                  <a:tcPr marL="68580" marR="68580" marT="0" marB="0"/>
+                </a:tc>
+              </a:tr>
+            </a:tbl>
+          </a:graphicData>
+        </a:graphic>
+      </p:graphicFrame>
+    </p:spTree>
+    <p:extLst>
+      <p:ext uri="{BB962C8B-B14F-4D97-AF65-F5344CB8AC3E}">
+        <p14:creationId xmlns:p14="http://schemas.microsoft.com/office/powerpoint/2010/main" val="2104207355"/>
+      </p:ext>
+    </p:extLst>
+  </p:cSld>
+  <p:clrMapOvr>
+    <a:masterClrMapping/>
+  </p:clrMapOvr>
+</p:sld>
+</file>
+
+<file path=ppt/slides/slide16.xml><?xml version="1.0" encoding="utf-8"?>
+<p:sld xmlns:a="http://schemas.openxmlformats.org/drawingml/2006/main" xmlns:r="http://schemas.openxmlformats.org/officeDocument/2006/relationships" xmlns:p="http://schemas.openxmlformats.org/presentationml/2006/main">
+  <p:cSld>
+    <p:spTree>
+      <p:nvGrpSpPr>
+        <p:cNvPr id="1" name=""/>
+        <p:cNvGrpSpPr/>
+        <p:nvPr/>
+      </p:nvGrpSpPr>
+      <p:grpSpPr>
+        <a:xfrm>
+          <a:off x="0" y="0"/>
+          <a:ext cx="0" cy="0"/>
+          <a:chOff x="0" y="0"/>
+          <a:chExt cx="0" cy="0"/>
+        </a:xfrm>
+      </p:grpSpPr>
+      <p:sp>
+        <p:nvSpPr>
+          <p:cNvPr id="2" name="Título 1"/>
+          <p:cNvSpPr>
+            <a:spLocks noGrp="1"/>
+          </p:cNvSpPr>
+          <p:nvPr>
+            <p:ph type="title"/>
+          </p:nvPr>
+        </p:nvSpPr>
+        <p:spPr/>
+        <p:txBody>
+          <a:bodyPr/>
+          <a:lstStyle/>
+          <a:p>
+            <a:r>
+              <a:rPr lang="es-ES" dirty="0" smtClean="0"/>
+              <a:t>Requisitos no Funcionales</a:t>
+            </a:r>
+            <a:endParaRPr lang="es-ES" dirty="0"/>
+          </a:p>
+        </p:txBody>
+      </p:sp>
+      <p:sp>
+        <p:nvSpPr>
+          <p:cNvPr id="3" name="Marcador de contenido 2"/>
+          <p:cNvSpPr>
+            <a:spLocks noGrp="1"/>
+          </p:cNvSpPr>
+          <p:nvPr>
+            <p:ph idx="1"/>
+          </p:nvPr>
+        </p:nvSpPr>
+        <p:spPr>
+          <a:xfrm>
+            <a:off x="1154953" y="2678315"/>
+            <a:ext cx="4306507" cy="2517140"/>
+          </a:xfrm>
+        </p:spPr>
+        <p:txBody>
+          <a:bodyPr>
+            <a:normAutofit/>
+          </a:bodyPr>
+          <a:lstStyle/>
+          <a:p>
+            <a:r>
+              <a:rPr lang="es-ES" sz="2800" dirty="0"/>
+              <a:t>Seguridad</a:t>
+            </a:r>
+          </a:p>
+          <a:p>
+            <a:r>
+              <a:rPr lang="es-ES" sz="2800" dirty="0"/>
+              <a:t>Rendimiento</a:t>
+            </a:r>
+          </a:p>
+          <a:p>
+            <a:r>
+              <a:rPr lang="es-ES" sz="2800" dirty="0"/>
+              <a:t>Software</a:t>
+            </a:r>
+          </a:p>
+          <a:p>
+            <a:r>
+              <a:rPr lang="es-ES" sz="2800" dirty="0"/>
+              <a:t>Hardware</a:t>
+            </a:r>
+          </a:p>
+          <a:p>
+            <a:endParaRPr lang="es-ES" sz="2800" dirty="0"/>
+          </a:p>
+          <a:p>
+            <a:endParaRPr lang="es-ES" sz="2800" dirty="0"/>
+          </a:p>
+        </p:txBody>
+      </p:sp>
+    </p:spTree>
+    <p:extLst>
+      <p:ext uri="{BB962C8B-B14F-4D97-AF65-F5344CB8AC3E}">
+        <p14:creationId xmlns:p14="http://schemas.microsoft.com/office/powerpoint/2010/main" val="3254529160"/>
+      </p:ext>
+    </p:extLst>
+  </p:cSld>
+  <p:clrMapOvr>
+    <a:masterClrMapping/>
+  </p:clrMapOvr>
+</p:sld>
+</file>
+
+<file path=ppt/slides/slide17.xml><?xml version="1.0" encoding="utf-8"?>
+<p:sld xmlns:a="http://schemas.openxmlformats.org/drawingml/2006/main" xmlns:r="http://schemas.openxmlformats.org/officeDocument/2006/relationships" xmlns:p="http://schemas.openxmlformats.org/presentationml/2006/main">
+  <p:cSld>
+    <p:spTree>
+      <p:nvGrpSpPr>
+        <p:cNvPr id="1" name=""/>
+        <p:cNvGrpSpPr/>
+        <p:nvPr/>
+      </p:nvGrpSpPr>
+      <p:grpSpPr>
+        <a:xfrm>
+          <a:off x="0" y="0"/>
+          <a:ext cx="0" cy="0"/>
+          <a:chOff x="0" y="0"/>
+          <a:chExt cx="0" cy="0"/>
+        </a:xfrm>
+      </p:grpSpPr>
+      <p:sp>
+        <p:nvSpPr>
+          <p:cNvPr id="2" name="Título 1"/>
+          <p:cNvSpPr>
+            <a:spLocks noGrp="1"/>
+          </p:cNvSpPr>
+          <p:nvPr>
+            <p:ph type="title"/>
+          </p:nvPr>
+        </p:nvSpPr>
+        <p:spPr/>
+        <p:txBody>
+          <a:bodyPr/>
+          <a:lstStyle/>
+          <a:p>
+            <a:r>
+              <a:rPr lang="es-ES" dirty="0" smtClean="0"/>
+              <a:t>Arquitectura de Software</a:t>
+            </a:r>
+            <a:endParaRPr lang="es-ES" dirty="0"/>
+          </a:p>
+        </p:txBody>
+      </p:sp>
+      <p:pic>
+        <p:nvPicPr>
+          <p:cNvPr id="4" name="Marcador de contenido 3"/>
+          <p:cNvPicPr>
+            <a:picLocks noGrp="1" noChangeAspect="1"/>
+          </p:cNvPicPr>
+          <p:nvPr>
+            <p:ph idx="1"/>
+          </p:nvPr>
+        </p:nvPicPr>
+        <p:blipFill>
+          <a:blip r:embed="rId2">
+            <a:extLst>
+              <a:ext uri="{28A0092B-C50C-407E-A947-70E740481C1C}">
+                <a14:useLocalDpi xmlns:a14="http://schemas.microsoft.com/office/drawing/2010/main" val="0"/>
+              </a:ext>
+            </a:extLst>
+          </a:blip>
+          <a:stretch>
+            <a:fillRect/>
+          </a:stretch>
+        </p:blipFill>
+        <p:spPr>
+          <a:xfrm>
+            <a:off x="2527627" y="2368731"/>
+            <a:ext cx="7388739" cy="4156166"/>
+          </a:xfrm>
+        </p:spPr>
+      </p:pic>
+    </p:spTree>
+    <p:extLst>
+      <p:ext uri="{BB962C8B-B14F-4D97-AF65-F5344CB8AC3E}">
+        <p14:creationId xmlns:p14="http://schemas.microsoft.com/office/powerpoint/2010/main" val="77189681"/>
+      </p:ext>
+    </p:extLst>
+  </p:cSld>
+  <p:clrMapOvr>
+    <a:masterClrMapping/>
+  </p:clrMapOvr>
+</p:sld>
+</file>
+
+<file path=ppt/slides/slide18.xml><?xml version="1.0" encoding="utf-8"?>
+<p:sld xmlns:a="http://schemas.openxmlformats.org/drawingml/2006/main" xmlns:r="http://schemas.openxmlformats.org/officeDocument/2006/relationships" xmlns:p="http://schemas.openxmlformats.org/presentationml/2006/main">
+  <p:cSld>
+    <p:spTree>
+      <p:nvGrpSpPr>
+        <p:cNvPr id="1" name=""/>
+        <p:cNvGrpSpPr/>
+        <p:nvPr/>
+      </p:nvGrpSpPr>
+      <p:grpSpPr>
+        <a:xfrm>
+          <a:off x="0" y="0"/>
+          <a:ext cx="0" cy="0"/>
+          <a:chOff x="0" y="0"/>
+          <a:chExt cx="0" cy="0"/>
+        </a:xfrm>
+      </p:grpSpPr>
+      <p:sp>
+        <p:nvSpPr>
+          <p:cNvPr id="2" name="Título 1"/>
+          <p:cNvSpPr>
+            <a:spLocks noGrp="1"/>
+          </p:cNvSpPr>
+          <p:nvPr>
+            <p:ph type="title"/>
+          </p:nvPr>
+        </p:nvSpPr>
+        <p:spPr/>
+        <p:txBody>
+          <a:bodyPr/>
+          <a:lstStyle/>
+          <a:p>
+            <a:r>
+              <a:rPr lang="es-ES" dirty="0" smtClean="0"/>
+              <a:t>Patrones</a:t>
+            </a:r>
+            <a:endParaRPr lang="es-ES" dirty="0"/>
+          </a:p>
+        </p:txBody>
+      </p:sp>
+      <p:sp>
+        <p:nvSpPr>
+          <p:cNvPr id="3" name="Marcador de contenido 2"/>
+          <p:cNvSpPr>
+            <a:spLocks noGrp="1"/>
+          </p:cNvSpPr>
+          <p:nvPr>
+            <p:ph idx="1"/>
+          </p:nvPr>
+        </p:nvSpPr>
+        <p:spPr/>
+        <p:txBody>
+          <a:bodyPr/>
+          <a:lstStyle/>
+          <a:p>
+            <a:pPr marL="0" indent="0">
+              <a:buNone/>
+            </a:pPr>
+            <a:r>
+              <a:rPr lang="es-ES" b="1" dirty="0"/>
+              <a:t>Patrones </a:t>
+            </a:r>
+            <a:r>
+              <a:rPr lang="es-ES" b="1" dirty="0" smtClean="0"/>
+              <a:t>GRASP</a:t>
+            </a:r>
+          </a:p>
+          <a:p>
+            <a:r>
+              <a:rPr lang="es-ES" dirty="0"/>
+              <a:t>Experto</a:t>
+            </a:r>
+          </a:p>
+          <a:p>
+            <a:r>
+              <a:rPr lang="es-ES" dirty="0"/>
+              <a:t>Creador</a:t>
+            </a:r>
+          </a:p>
+          <a:p>
+            <a:r>
+              <a:rPr lang="es-ES" dirty="0"/>
+              <a:t>Alta cohesión y bajo </a:t>
+            </a:r>
+            <a:r>
+              <a:rPr lang="es-ES" dirty="0" smtClean="0"/>
+              <a:t>acoplamiento</a:t>
+            </a:r>
+          </a:p>
+          <a:p>
+            <a:endParaRPr lang="es-ES" b="1" dirty="0"/>
+          </a:p>
+          <a:p>
+            <a:pPr marL="0" indent="0">
+              <a:buNone/>
+            </a:pPr>
+            <a:r>
+              <a:rPr lang="es-ES" b="1" dirty="0"/>
+              <a:t>Patrones </a:t>
+            </a:r>
+            <a:r>
+              <a:rPr lang="es-ES" b="1" dirty="0" smtClean="0"/>
+              <a:t>GOF</a:t>
+            </a:r>
+          </a:p>
+          <a:p>
+            <a:r>
+              <a:rPr lang="es-ES" dirty="0" err="1" smtClean="0"/>
+              <a:t>Singleton</a:t>
+            </a:r>
+            <a:endParaRPr lang="es-ES" dirty="0" smtClean="0"/>
+          </a:p>
+          <a:p>
+            <a:r>
+              <a:rPr lang="es-ES" dirty="0" err="1"/>
+              <a:t>Template</a:t>
+            </a:r>
+            <a:r>
+              <a:rPr lang="es-ES" dirty="0"/>
+              <a:t> </a:t>
+            </a:r>
+            <a:r>
+              <a:rPr lang="es-ES" dirty="0" err="1"/>
+              <a:t>Method</a:t>
+            </a:r>
+            <a:endParaRPr lang="es-ES" dirty="0"/>
+          </a:p>
+          <a:p>
+            <a:endParaRPr lang="es-ES" b="1" dirty="0"/>
+          </a:p>
+        </p:txBody>
+      </p:sp>
+    </p:spTree>
+    <p:extLst>
+      <p:ext uri="{BB962C8B-B14F-4D97-AF65-F5344CB8AC3E}">
+        <p14:creationId xmlns:p14="http://schemas.microsoft.com/office/powerpoint/2010/main" val="1958590040"/>
+      </p:ext>
+    </p:extLst>
+  </p:cSld>
+  <p:clrMapOvr>
+    <a:masterClrMapping/>
+  </p:clrMapOvr>
+</p:sld>
+</file>
+
+<file path=ppt/slides/slide19.xml><?xml version="1.0" encoding="utf-8"?>
+<p:sld xmlns:a="http://schemas.openxmlformats.org/drawingml/2006/main" xmlns:r="http://schemas.openxmlformats.org/officeDocument/2006/relationships" xmlns:p="http://schemas.openxmlformats.org/presentationml/2006/main">
+  <p:cSld>
+    <p:spTree>
+      <p:nvGrpSpPr>
+        <p:cNvPr id="1" name=""/>
+        <p:cNvGrpSpPr/>
+        <p:nvPr/>
+      </p:nvGrpSpPr>
+      <p:grpSpPr>
+        <a:xfrm>
+          <a:off x="0" y="0"/>
+          <a:ext cx="0" cy="0"/>
+          <a:chOff x="0" y="0"/>
+          <a:chExt cx="0" cy="0"/>
+        </a:xfrm>
+      </p:grpSpPr>
+      <p:sp>
+        <p:nvSpPr>
+          <p:cNvPr id="2" name="Título 1"/>
+          <p:cNvSpPr>
+            <a:spLocks noGrp="1"/>
+          </p:cNvSpPr>
+          <p:nvPr>
+            <p:ph type="title"/>
+          </p:nvPr>
+        </p:nvSpPr>
+        <p:spPr/>
+        <p:txBody>
+          <a:bodyPr/>
+          <a:lstStyle/>
+          <a:p>
+            <a:r>
+              <a:rPr lang="es-ES" dirty="0" smtClean="0"/>
+              <a:t>Conclusiones Generales</a:t>
+            </a:r>
+            <a:endParaRPr lang="es-ES" dirty="0"/>
+          </a:p>
+        </p:txBody>
+      </p:sp>
+      <p:sp>
+        <p:nvSpPr>
+          <p:cNvPr id="3" name="Marcador de contenido 2"/>
+          <p:cNvSpPr>
+            <a:spLocks noGrp="1"/>
+          </p:cNvSpPr>
+          <p:nvPr>
+            <p:ph idx="1"/>
+          </p:nvPr>
+        </p:nvSpPr>
+        <p:spPr/>
+        <p:txBody>
+          <a:bodyPr/>
+          <a:lstStyle/>
+          <a:p>
+            <a:pPr marL="0" indent="0" algn="just">
+              <a:buNone/>
+            </a:pPr>
+            <a:r>
+              <a:rPr lang="es-ES" dirty="0"/>
+              <a:t>Dado el estudio del marco teórico se logró llegar a una solución que cumpla todas las necesidades establecidas por el cliente y la descripción del Sistema de solución permitió tener un amplio entendimiento del mismo. </a:t>
+            </a:r>
+          </a:p>
+          <a:p>
+            <a:pPr marL="0" indent="0" algn="just">
+              <a:buNone/>
+            </a:pPr>
+            <a:endParaRPr lang="en-US" dirty="0" smtClean="0"/>
+          </a:p>
+          <a:p>
+            <a:pPr marL="0" indent="0" algn="just">
+              <a:buNone/>
+            </a:pPr>
+            <a:r>
+              <a:rPr lang="en-US" dirty="0" smtClean="0"/>
+              <a:t>Con la </a:t>
+            </a:r>
+            <a:r>
+              <a:rPr lang="en-US" dirty="0" err="1" smtClean="0"/>
+              <a:t>definición</a:t>
+            </a:r>
+            <a:r>
+              <a:rPr lang="en-US" dirty="0" smtClean="0"/>
+              <a:t> de la </a:t>
+            </a:r>
+            <a:r>
+              <a:rPr lang="en-US" dirty="0" err="1" smtClean="0"/>
+              <a:t>arquitectura</a:t>
+            </a:r>
+            <a:r>
+              <a:rPr lang="en-US" dirty="0" smtClean="0"/>
+              <a:t>, los </a:t>
+            </a:r>
+            <a:r>
+              <a:rPr lang="en-US" dirty="0" err="1" smtClean="0"/>
+              <a:t>patrones</a:t>
+            </a:r>
+            <a:r>
+              <a:rPr lang="en-US" dirty="0" smtClean="0"/>
+              <a:t> de </a:t>
+            </a:r>
+            <a:r>
+              <a:rPr lang="en-US" dirty="0" err="1" smtClean="0"/>
+              <a:t>dise</a:t>
+            </a:r>
+            <a:r>
+              <a:rPr lang="es-ES" dirty="0" err="1" smtClean="0"/>
+              <a:t>ño</a:t>
+            </a:r>
+            <a:r>
+              <a:rPr lang="en-US" dirty="0" smtClean="0"/>
+              <a:t> y los </a:t>
+            </a:r>
+            <a:r>
+              <a:rPr lang="en-US" dirty="0" err="1" smtClean="0"/>
+              <a:t>estándares</a:t>
+            </a:r>
+            <a:r>
+              <a:rPr lang="en-US" dirty="0" smtClean="0"/>
+              <a:t> de </a:t>
+            </a:r>
+            <a:r>
+              <a:rPr lang="en-US" dirty="0" err="1" smtClean="0"/>
+              <a:t>codificación</a:t>
+            </a:r>
+            <a:r>
+              <a:rPr lang="en-US" dirty="0" smtClean="0"/>
+              <a:t> se </a:t>
+            </a:r>
+            <a:r>
+              <a:rPr lang="en-US" dirty="0" err="1" smtClean="0"/>
+              <a:t>logró</a:t>
+            </a:r>
+            <a:r>
+              <a:rPr lang="en-US" dirty="0" smtClean="0"/>
+              <a:t> el </a:t>
+            </a:r>
+            <a:r>
+              <a:rPr lang="en-US" dirty="0" err="1" smtClean="0"/>
+              <a:t>empleo</a:t>
+            </a:r>
+            <a:r>
+              <a:rPr lang="en-US" dirty="0" smtClean="0"/>
+              <a:t> de </a:t>
+            </a:r>
+            <a:r>
+              <a:rPr lang="en-US" dirty="0" err="1" smtClean="0"/>
+              <a:t>buenas</a:t>
+            </a:r>
+            <a:r>
+              <a:rPr lang="en-US" dirty="0" smtClean="0"/>
+              <a:t> </a:t>
+            </a:r>
+            <a:r>
+              <a:rPr lang="en-US" dirty="0" err="1" smtClean="0"/>
+              <a:t>prácticas</a:t>
+            </a:r>
+            <a:r>
+              <a:rPr lang="en-US" dirty="0" smtClean="0"/>
+              <a:t> para la </a:t>
+            </a:r>
+            <a:r>
+              <a:rPr lang="en-US" dirty="0" err="1" smtClean="0"/>
+              <a:t>implementación</a:t>
+            </a:r>
+            <a:r>
+              <a:rPr lang="en-US" dirty="0" smtClean="0"/>
+              <a:t> del Sistema de </a:t>
+            </a:r>
+            <a:r>
+              <a:rPr lang="en-US" dirty="0" err="1" smtClean="0"/>
+              <a:t>recomendaciones</a:t>
+            </a:r>
+            <a:r>
+              <a:rPr lang="en-US" dirty="0"/>
+              <a:t>.</a:t>
+            </a:r>
+            <a:endParaRPr lang="es-ES" dirty="0"/>
+          </a:p>
+        </p:txBody>
+      </p:sp>
+    </p:spTree>
+    <p:extLst>
+      <p:ext uri="{BB962C8B-B14F-4D97-AF65-F5344CB8AC3E}">
+        <p14:creationId xmlns:p14="http://schemas.microsoft.com/office/powerpoint/2010/main" val="1246272806"/>
+      </p:ext>
+    </p:extLst>
+  </p:cSld>
+  <p:clrMapOvr>
+    <a:masterClrMapping/>
+  </p:clrMapOvr>
 </p:sld>
 </file>
 
@@ -13881,106 +16186,85 @@
           <a:p>
             <a:r>
               <a:rPr lang="es-ES" dirty="0" smtClean="0"/>
-              <a:t>Proyecto z17</a:t>
+              <a:t>Sistema de </a:t>
+            </a:r>
+            <a:r>
+              <a:rPr lang="es-ES" dirty="0" smtClean="0"/>
+              <a:t>recomendación</a:t>
             </a:r>
             <a:endParaRPr lang="es-ES" dirty="0"/>
           </a:p>
         </p:txBody>
       </p:sp>
-      <p:sp>
-        <p:nvSpPr>
-          <p:cNvPr id="3" name="Marcador de contenido 2"/>
-          <p:cNvSpPr>
-            <a:spLocks noGrp="1"/>
-          </p:cNvSpPr>
+      <p:pic>
+        <p:nvPicPr>
+          <p:cNvPr id="4" name="Marcador de contenido 3"/>
+          <p:cNvPicPr>
+            <a:picLocks noGrp="1" noChangeAspect="1"/>
+          </p:cNvPicPr>
           <p:nvPr>
             <p:ph idx="1"/>
           </p:nvPr>
-        </p:nvSpPr>
-        <p:spPr/>
-        <p:txBody>
-          <a:bodyPr/>
-          <a:lstStyle/>
-          <a:p>
-            <a:r>
-              <a:rPr lang="es-ES" dirty="0" err="1"/>
-              <a:t>Apklis</a:t>
-            </a:r>
-            <a:r>
-              <a:rPr lang="es-ES" dirty="0"/>
-              <a:t>: Es el Centro Cubano de Aplicaciones </a:t>
-            </a:r>
-            <a:r>
-              <a:rPr lang="es-ES" dirty="0" err="1"/>
-              <a:t>Android</a:t>
-            </a:r>
-            <a:r>
-              <a:rPr lang="es-ES" dirty="0"/>
-              <a:t> enfocado en la distribución, actualización y comercialización de aplicaciones.</a:t>
-            </a:r>
-          </a:p>
-          <a:p>
-            <a:pPr marL="0" indent="0">
-              <a:buNone/>
-            </a:pPr>
-            <a:endParaRPr lang="es-ES" dirty="0"/>
-          </a:p>
-          <a:p>
-            <a:r>
-              <a:rPr lang="es-ES" dirty="0" err="1"/>
-              <a:t>toDus</a:t>
-            </a:r>
-            <a:r>
-              <a:rPr lang="es-ES" dirty="0"/>
-              <a:t>: La plataforma cubana de mensajería instantánea y colaborativa que permite el intercambio de mensajes, archivos y mucho más de forma inmediata.</a:t>
-            </a:r>
-          </a:p>
-          <a:p>
-            <a:pPr marL="0" indent="0">
-              <a:buNone/>
-            </a:pPr>
-            <a:endParaRPr lang="es-ES" dirty="0"/>
-          </a:p>
-          <a:p>
-            <a:r>
-              <a:rPr lang="es-ES" dirty="0" err="1"/>
-              <a:t>Picta</a:t>
-            </a:r>
-            <a:r>
-              <a:rPr lang="es-ES" dirty="0"/>
-              <a:t>: Una plataforma de contenido multimedia que permite la reproducción y transmisión en vivo (</a:t>
-            </a:r>
-            <a:r>
-              <a:rPr lang="es-ES" i="1" dirty="0"/>
-              <a:t>Z17</a:t>
-            </a:r>
-            <a:r>
-              <a:rPr lang="es-ES" dirty="0"/>
-              <a:t>, s. f.).</a:t>
-            </a:r>
-          </a:p>
-          <a:p>
-            <a:endParaRPr lang="es-ES" dirty="0"/>
-          </a:p>
-        </p:txBody>
-      </p:sp>
+        </p:nvPicPr>
+        <p:blipFill>
+          <a:blip r:embed="rId2">
+            <a:extLst>
+              <a:ext uri="{28A0092B-C50C-407E-A947-70E740481C1C}">
+                <a14:useLocalDpi xmlns:a14="http://schemas.microsoft.com/office/drawing/2010/main" val="0"/>
+              </a:ext>
+            </a:extLst>
+          </a:blip>
+          <a:stretch>
+            <a:fillRect/>
+          </a:stretch>
+        </p:blipFill>
+        <p:spPr>
+          <a:xfrm>
+            <a:off x="461079" y="2551185"/>
+            <a:ext cx="5074580" cy="3843378"/>
+          </a:xfrm>
+        </p:spPr>
+      </p:pic>
+      <p:pic>
+        <p:nvPicPr>
+          <p:cNvPr id="6" name="Imagen 5"/>
+          <p:cNvPicPr>
+            <a:picLocks noChangeAspect="1"/>
+          </p:cNvPicPr>
+          <p:nvPr/>
+        </p:nvPicPr>
+        <p:blipFill>
+          <a:blip r:embed="rId3">
+            <a:extLst>
+              <a:ext uri="{28A0092B-C50C-407E-A947-70E740481C1C}">
+                <a14:useLocalDpi xmlns:a14="http://schemas.microsoft.com/office/drawing/2010/main" val="0"/>
+              </a:ext>
+            </a:extLst>
+          </a:blip>
+          <a:stretch>
+            <a:fillRect/>
+          </a:stretch>
+        </p:blipFill>
+        <p:spPr>
+          <a:xfrm>
+            <a:off x="5832121" y="2941262"/>
+            <a:ext cx="5927684" cy="3219977"/>
+          </a:xfrm>
+          <a:prstGeom prst="rect">
+            <a:avLst/>
+          </a:prstGeom>
+        </p:spPr>
+      </p:pic>
     </p:spTree>
     <p:extLst>
       <p:ext uri="{BB962C8B-B14F-4D97-AF65-F5344CB8AC3E}">
-        <p14:creationId xmlns:p14="http://schemas.microsoft.com/office/powerpoint/2010/main" val="2998970640"/>
+        <p14:creationId xmlns:p14="http://schemas.microsoft.com/office/powerpoint/2010/main" val="2684107941"/>
       </p:ext>
     </p:extLst>
   </p:cSld>
   <p:clrMapOvr>
     <a:masterClrMapping/>
   </p:clrMapOvr>
-  <p:timing>
-    <p:tnLst>
-      <p:par>
-        <p:cTn id="1" dur="indefinite" restart="never" nodeType="tmRoot"/>
-      </p:par>
-    </p:tnLst>
-  </p:timing>
 </p:sld>
 </file>
 
@@ -14017,6 +16301,143 @@
           <a:lstStyle/>
           <a:p>
             <a:r>
+              <a:rPr lang="es-ES" dirty="0" smtClean="0"/>
+              <a:t>Proyecto z17</a:t>
+            </a:r>
+            <a:endParaRPr lang="es-ES" dirty="0"/>
+          </a:p>
+        </p:txBody>
+      </p:sp>
+      <p:sp>
+        <p:nvSpPr>
+          <p:cNvPr id="3" name="Marcador de contenido 2"/>
+          <p:cNvSpPr>
+            <a:spLocks noGrp="1"/>
+          </p:cNvSpPr>
+          <p:nvPr>
+            <p:ph idx="1"/>
+          </p:nvPr>
+        </p:nvSpPr>
+        <p:spPr/>
+        <p:txBody>
+          <a:bodyPr/>
+          <a:lstStyle/>
+          <a:p>
+            <a:r>
+              <a:rPr lang="es-ES" dirty="0" err="1"/>
+              <a:t>Apklis</a:t>
+            </a:r>
+            <a:r>
+              <a:rPr lang="es-ES" dirty="0"/>
+              <a:t>: Es el Centro Cubano de Aplicaciones </a:t>
+            </a:r>
+            <a:r>
+              <a:rPr lang="es-ES" dirty="0" err="1"/>
+              <a:t>Android</a:t>
+            </a:r>
+            <a:r>
+              <a:rPr lang="es-ES" dirty="0"/>
+              <a:t> enfocado en la distribución, actualización y comercialización de aplicaciones.</a:t>
+            </a:r>
+          </a:p>
+          <a:p>
+            <a:pPr marL="0" indent="0">
+              <a:buNone/>
+            </a:pPr>
+            <a:endParaRPr lang="es-ES" dirty="0"/>
+          </a:p>
+          <a:p>
+            <a:r>
+              <a:rPr lang="es-ES" dirty="0" err="1"/>
+              <a:t>toDus</a:t>
+            </a:r>
+            <a:r>
+              <a:rPr lang="es-ES" dirty="0"/>
+              <a:t>: La plataforma cubana de mensajería instantánea y colaborativa que permite el intercambio de mensajes, archivos y mucho más de forma inmediata.</a:t>
+            </a:r>
+          </a:p>
+          <a:p>
+            <a:pPr marL="0" indent="0">
+              <a:buNone/>
+            </a:pPr>
+            <a:endParaRPr lang="es-ES" dirty="0"/>
+          </a:p>
+          <a:p>
+            <a:r>
+              <a:rPr lang="es-ES" dirty="0" err="1"/>
+              <a:t>Picta</a:t>
+            </a:r>
+            <a:r>
+              <a:rPr lang="es-ES" dirty="0"/>
+              <a:t>: Una plataforma de contenido multimedia que permite la reproducción y transmisión en vivo (</a:t>
+            </a:r>
+            <a:r>
+              <a:rPr lang="es-ES" i="1" dirty="0"/>
+              <a:t>Z17</a:t>
+            </a:r>
+            <a:r>
+              <a:rPr lang="es-ES" dirty="0"/>
+              <a:t>, s. f.).</a:t>
+            </a:r>
+          </a:p>
+          <a:p>
+            <a:endParaRPr lang="es-ES" dirty="0"/>
+          </a:p>
+        </p:txBody>
+      </p:sp>
+    </p:spTree>
+    <p:extLst>
+      <p:ext uri="{BB962C8B-B14F-4D97-AF65-F5344CB8AC3E}">
+        <p14:creationId xmlns:p14="http://schemas.microsoft.com/office/powerpoint/2010/main" val="2998970640"/>
+      </p:ext>
+    </p:extLst>
+  </p:cSld>
+  <p:clrMapOvr>
+    <a:masterClrMapping/>
+  </p:clrMapOvr>
+  <p:timing>
+    <p:tnLst>
+      <p:par>
+        <p:cTn id="1" dur="indefinite" restart="never" nodeType="tmRoot"/>
+      </p:par>
+    </p:tnLst>
+  </p:timing>
+</p:sld>
+</file>
+
+<file path=ppt/slides/slide4.xml><?xml version="1.0" encoding="utf-8"?>
+<p:sld xmlns:a="http://schemas.openxmlformats.org/drawingml/2006/main" xmlns:r="http://schemas.openxmlformats.org/officeDocument/2006/relationships" xmlns:p="http://schemas.openxmlformats.org/presentationml/2006/main">
+  <p:cSld>
+    <p:spTree>
+      <p:nvGrpSpPr>
+        <p:cNvPr id="1" name=""/>
+        <p:cNvGrpSpPr/>
+        <p:nvPr/>
+      </p:nvGrpSpPr>
+      <p:grpSpPr>
+        <a:xfrm>
+          <a:off x="0" y="0"/>
+          <a:ext cx="0" cy="0"/>
+          <a:chOff x="0" y="0"/>
+          <a:chExt cx="0" cy="0"/>
+        </a:xfrm>
+      </p:grpSpPr>
+      <p:sp>
+        <p:nvSpPr>
+          <p:cNvPr id="2" name="Título 1"/>
+          <p:cNvSpPr>
+            <a:spLocks noGrp="1"/>
+          </p:cNvSpPr>
+          <p:nvPr>
+            <p:ph type="title"/>
+          </p:nvPr>
+        </p:nvSpPr>
+        <p:spPr/>
+        <p:txBody>
+          <a:bodyPr/>
+          <a:lstStyle/>
+          <a:p>
+            <a:r>
               <a:rPr lang="en-US" dirty="0" smtClean="0"/>
               <a:t>Problem</a:t>
             </a:r>
@@ -14054,38 +16475,38 @@
           <a:lstStyle/>
           <a:p>
             <a:r>
-              <a:rPr lang="es-ES" dirty="0"/>
+              <a:rPr lang="es-ES" sz="2800" dirty="0"/>
               <a:t>Lentitud</a:t>
             </a:r>
           </a:p>
           <a:p>
             <a:r>
-              <a:rPr lang="es-ES" dirty="0"/>
+              <a:rPr lang="es-ES" sz="2800" dirty="0"/>
               <a:t>Personalización</a:t>
             </a:r>
           </a:p>
           <a:p>
             <a:r>
-              <a:rPr lang="es-ES" dirty="0"/>
+              <a:rPr lang="es-ES" sz="2800" dirty="0"/>
               <a:t>Precisión</a:t>
             </a:r>
           </a:p>
           <a:p>
             <a:r>
-              <a:rPr lang="es-ES" dirty="0"/>
+              <a:rPr lang="es-ES" sz="2800" dirty="0"/>
               <a:t>Adaptabilidad</a:t>
             </a:r>
           </a:p>
           <a:p>
             <a:r>
-              <a:rPr lang="en-US" dirty="0" err="1" smtClean="0"/>
+              <a:rPr lang="en-US" sz="2800" dirty="0" err="1" smtClean="0"/>
               <a:t>Escalabilidad</a:t>
             </a:r>
-            <a:endParaRPr lang="en-US" dirty="0" smtClean="0"/>
-          </a:p>
-          <a:p>
-            <a:r>
-              <a:rPr lang="es-ES" dirty="0"/>
+            <a:endParaRPr lang="en-US" sz="2800" dirty="0" smtClean="0"/>
+          </a:p>
+          <a:p>
+            <a:r>
+              <a:rPr lang="es-ES" sz="2800" dirty="0"/>
               <a:t>Volumen de datos</a:t>
             </a:r>
           </a:p>
@@ -14114,7 +16535,7 @@
 </p:sld>
 </file>
 
-<file path=ppt/slides/slide4.xml><?xml version="1.0" encoding="utf-8"?>
+<file path=ppt/slides/slide5.xml><?xml version="1.0" encoding="utf-8"?>
 <p:sld xmlns:a="http://schemas.openxmlformats.org/drawingml/2006/main" xmlns:r="http://schemas.openxmlformats.org/officeDocument/2006/relationships" xmlns:p="http://schemas.openxmlformats.org/presentationml/2006/main">
   <p:cSld>
     <p:spTree>
@@ -14516,7 +16937,7 @@
 </p:sld>
 </file>
 
-<file path=ppt/slides/slide5.xml><?xml version="1.0" encoding="utf-8"?>
+<file path=ppt/slides/slide6.xml><?xml version="1.0" encoding="utf-8"?>
 <p:sld xmlns:a="http://schemas.openxmlformats.org/drawingml/2006/main" xmlns:r="http://schemas.openxmlformats.org/officeDocument/2006/relationships" xmlns:p="http://schemas.openxmlformats.org/presentationml/2006/main">
   <p:cSld>
     <p:spTree>
@@ -14609,7 +17030,7 @@
 </p:sld>
 </file>
 
-<file path=ppt/slides/slide6.xml><?xml version="1.0" encoding="utf-8"?>
+<file path=ppt/slides/slide7.xml><?xml version="1.0" encoding="utf-8"?>
 <p:sld xmlns:a="http://schemas.openxmlformats.org/drawingml/2006/main" xmlns:r="http://schemas.openxmlformats.org/officeDocument/2006/relationships" xmlns:p="http://schemas.openxmlformats.org/presentationml/2006/main">
   <p:cSld>
     <p:spTree>
@@ -15050,7 +17471,7 @@
 </p:sld>
 </file>
 
-<file path=ppt/slides/slide7.xml><?xml version="1.0" encoding="utf-8"?>
+<file path=ppt/slides/slide8.xml><?xml version="1.0" encoding="utf-8"?>
 <p:sld xmlns:a="http://schemas.openxmlformats.org/drawingml/2006/main" xmlns:r="http://schemas.openxmlformats.org/officeDocument/2006/relationships" xmlns:p="http://schemas.openxmlformats.org/presentationml/2006/main">
   <p:cSld>
     <p:spTree>
@@ -15107,85 +17528,80 @@
           </a:xfrm>
         </p:spPr>
         <p:txBody>
-          <a:bodyPr/>
+          <a:bodyPr>
+            <a:normAutofit/>
+          </a:bodyPr>
           <a:lstStyle/>
           <a:p>
             <a:pPr marL="0" indent="0">
               <a:buNone/>
             </a:pPr>
             <a:r>
-              <a:rPr lang="es-ES" b="1" dirty="0"/>
+              <a:rPr lang="es-ES" sz="2400" b="1" dirty="0"/>
               <a:t>AUP versión </a:t>
             </a:r>
             <a:r>
-              <a:rPr lang="es-ES" b="1" dirty="0" smtClean="0"/>
-              <a:t>UCI escenario 2</a:t>
-            </a:r>
-          </a:p>
-          <a:p>
-            <a:r>
-              <a:rPr lang="es-ES" dirty="0" err="1" smtClean="0"/>
+              <a:rPr lang="es-ES" sz="2400" b="1" dirty="0" smtClean="0"/>
+              <a:t>UCI escenario </a:t>
+            </a:r>
+            <a:r>
+              <a:rPr lang="es-ES" sz="2400" b="1" dirty="0" smtClean="0"/>
+              <a:t>4</a:t>
+            </a:r>
+            <a:endParaRPr lang="es-ES" sz="2400" b="1" dirty="0" smtClean="0"/>
+          </a:p>
+          <a:p>
+            <a:r>
+              <a:rPr lang="es-ES" sz="2000" dirty="0" err="1" smtClean="0"/>
               <a:t>Agil</a:t>
             </a:r>
             <a:r>
-              <a:rPr lang="es-ES" dirty="0" smtClean="0"/>
+              <a:rPr lang="es-ES" sz="2000" dirty="0" smtClean="0"/>
               <a:t>.</a:t>
             </a:r>
           </a:p>
           <a:p>
             <a:r>
-              <a:rPr lang="es-ES" dirty="0" smtClean="0"/>
-              <a:t>Evaluación del Negocio.</a:t>
-            </a:r>
-          </a:p>
-          <a:p>
-            <a:r>
-              <a:rPr lang="es-ES" dirty="0" smtClean="0"/>
-              <a:t>Cero </a:t>
-            </a:r>
-            <a:r>
-              <a:rPr lang="es-ES" dirty="0"/>
-              <a:t>responsabilidades de las personas </a:t>
-            </a:r>
-            <a:r>
-              <a:rPr lang="es-ES" dirty="0" smtClean="0"/>
-              <a:t>que </a:t>
-            </a:r>
-            <a:r>
-              <a:rPr lang="es-ES" dirty="0"/>
-              <a:t>ejecutan las </a:t>
-            </a:r>
-            <a:r>
-              <a:rPr lang="es-ES" dirty="0" smtClean="0"/>
-              <a:t>actividades.</a:t>
-            </a:r>
-          </a:p>
-          <a:p>
-            <a:r>
-              <a:rPr lang="es-ES" dirty="0" smtClean="0"/>
-              <a:t>Modelación de los conceptos fundamentales del negocio.</a:t>
-            </a:r>
-          </a:p>
-          <a:p>
-            <a:r>
-              <a:rPr lang="es-ES" dirty="0" smtClean="0"/>
-              <a:t>El objetivo </a:t>
-            </a:r>
-            <a:r>
-              <a:rPr lang="es-ES" dirty="0"/>
-              <a:t>primario es la gestión y presentación de </a:t>
-            </a:r>
-            <a:r>
-              <a:rPr lang="es-ES" dirty="0" smtClean="0"/>
-              <a:t>información.</a:t>
-            </a:r>
-            <a:endParaRPr lang="es-ES" dirty="0"/>
+              <a:rPr lang="es-ES" sz="2000" dirty="0" smtClean="0"/>
+              <a:t>Pocos Artefactos.</a:t>
+            </a:r>
+            <a:endParaRPr lang="es-ES" sz="2000" dirty="0" smtClean="0"/>
+          </a:p>
+          <a:p>
+            <a:r>
+              <a:rPr lang="es-ES" sz="2000" dirty="0"/>
+              <a:t>P</a:t>
+            </a:r>
+            <a:r>
+              <a:rPr lang="es-ES" sz="2000" dirty="0" smtClean="0"/>
+              <a:t>royectos pequeños.</a:t>
+            </a:r>
+            <a:endParaRPr lang="es-ES" sz="2000" dirty="0" smtClean="0"/>
+          </a:p>
+          <a:p>
+            <a:r>
+              <a:rPr lang="es-ES" sz="2000" dirty="0"/>
+              <a:t>El cliente </a:t>
+            </a:r>
+            <a:r>
+              <a:rPr lang="es-ES" sz="2000" dirty="0" smtClean="0"/>
+              <a:t>siempre </a:t>
+            </a:r>
+            <a:r>
+              <a:rPr lang="es-ES" sz="2000" dirty="0"/>
+              <a:t>acompañando al equipo de </a:t>
+            </a:r>
+            <a:r>
+              <a:rPr lang="es-ES" sz="2000" dirty="0" smtClean="0"/>
+              <a:t>desarrollo.</a:t>
+            </a:r>
+            <a:endParaRPr lang="es-ES" sz="2000" dirty="0"/>
           </a:p>
         </p:txBody>
       </p:sp>
       <p:pic>
         <p:nvPicPr>
-          <p:cNvPr id="4" name="Imagen 3" descr="Captura de pantalla 2024-09-17 224237"/>
+          <p:cNvPr id="5" name="Imagen 4" descr="Captura de pantalla 2024-09-17 224245"/>
           <p:cNvPicPr/>
           <p:nvPr/>
         </p:nvPicPr>
@@ -15204,8 +17620,8 @@
         </p:blipFill>
         <p:spPr bwMode="auto">
           <a:xfrm>
-            <a:off x="9044940" y="3840480"/>
-            <a:ext cx="2324100" cy="655320"/>
+            <a:off x="9595659" y="3815542"/>
+            <a:ext cx="1435330" cy="1041862"/>
           </a:xfrm>
           <a:prstGeom prst="rect">
             <a:avLst/>
@@ -15233,6 +17649,1479 @@
       </p:par>
     </p:tnLst>
   </p:timing>
+</p:sld>
+</file>
+
+<file path=ppt/slides/slide9.xml><?xml version="1.0" encoding="utf-8"?>
+<p:sld xmlns:a="http://schemas.openxmlformats.org/drawingml/2006/main" xmlns:r="http://schemas.openxmlformats.org/officeDocument/2006/relationships" xmlns:p="http://schemas.openxmlformats.org/presentationml/2006/main">
+  <p:cSld>
+    <p:spTree>
+      <p:nvGrpSpPr>
+        <p:cNvPr id="1" name=""/>
+        <p:cNvGrpSpPr/>
+        <p:nvPr/>
+      </p:nvGrpSpPr>
+      <p:grpSpPr>
+        <a:xfrm>
+          <a:off x="0" y="0"/>
+          <a:ext cx="0" cy="0"/>
+          <a:chOff x="0" y="0"/>
+          <a:chExt cx="0" cy="0"/>
+        </a:xfrm>
+      </p:grpSpPr>
+      <p:sp>
+        <p:nvSpPr>
+          <p:cNvPr id="2" name="Título 1"/>
+          <p:cNvSpPr>
+            <a:spLocks noGrp="1"/>
+          </p:cNvSpPr>
+          <p:nvPr>
+            <p:ph type="title"/>
+          </p:nvPr>
+        </p:nvSpPr>
+        <p:spPr/>
+        <p:txBody>
+          <a:bodyPr/>
+          <a:lstStyle/>
+          <a:p>
+            <a:r>
+              <a:rPr lang="es-ES" dirty="0"/>
+              <a:t>Tecnologías y </a:t>
+            </a:r>
+            <a:r>
+              <a:rPr lang="es-ES" dirty="0" smtClean="0"/>
+              <a:t>herramientas</a:t>
+            </a:r>
+            <a:endParaRPr lang="es-ES" dirty="0"/>
+          </a:p>
+        </p:txBody>
+      </p:sp>
+      <p:sp>
+        <p:nvSpPr>
+          <p:cNvPr id="4" name="Marcador de contenido 2"/>
+          <p:cNvSpPr txBox="1">
+            <a:spLocks/>
+          </p:cNvSpPr>
+          <p:nvPr/>
+        </p:nvSpPr>
+        <p:spPr>
+          <a:xfrm>
+            <a:off x="997467" y="2514852"/>
+            <a:ext cx="2424986" cy="1018462"/>
+          </a:xfrm>
+          <a:prstGeom prst="rect">
+            <a:avLst/>
+          </a:prstGeom>
+        </p:spPr>
+        <p:txBody>
+          <a:bodyPr vert="horz" lIns="91440" tIns="45720" rIns="91440" bIns="45720" rtlCol="0">
+            <a:normAutofit/>
+          </a:bodyPr>
+          <a:lstStyle>
+            <a:lvl1pPr marL="342900" indent="-342900" algn="l" defTabSz="457200" rtl="0" eaLnBrk="1" latinLnBrk="0" hangingPunct="1">
+              <a:spcBef>
+                <a:spcPts val="1000"/>
+              </a:spcBef>
+              <a:spcAft>
+                <a:spcPts val="0"/>
+              </a:spcAft>
+              <a:buClr>
+                <a:schemeClr val="accent1"/>
+              </a:buClr>
+              <a:buSzPct val="80000"/>
+              <a:buFont typeface="Wingdings 3" charset="2"/>
+              <a:buChar char=""/>
+              <a:defRPr sz="1800" b="0" i="0" kern="1200">
+                <a:solidFill>
+                  <a:schemeClr val="tx1">
+                    <a:lumMod val="75000"/>
+                    <a:lumOff val="25000"/>
+                  </a:schemeClr>
+                </a:solidFill>
+                <a:latin typeface="+mn-lt"/>
+                <a:ea typeface="+mn-ea"/>
+                <a:cs typeface="+mn-cs"/>
+              </a:defRPr>
+            </a:lvl1pPr>
+            <a:lvl2pPr marL="742950" indent="-285750" algn="l" defTabSz="457200" rtl="0" eaLnBrk="1" latinLnBrk="0" hangingPunct="1">
+              <a:spcBef>
+                <a:spcPts val="1000"/>
+              </a:spcBef>
+              <a:spcAft>
+                <a:spcPts val="0"/>
+              </a:spcAft>
+              <a:buClr>
+                <a:schemeClr val="accent1"/>
+              </a:buClr>
+              <a:buSzPct val="80000"/>
+              <a:buFont typeface="Wingdings 3" charset="2"/>
+              <a:buChar char=""/>
+              <a:defRPr sz="1600" b="0" i="0" kern="1200">
+                <a:solidFill>
+                  <a:schemeClr val="tx1">
+                    <a:lumMod val="75000"/>
+                    <a:lumOff val="25000"/>
+                  </a:schemeClr>
+                </a:solidFill>
+                <a:latin typeface="+mn-lt"/>
+                <a:ea typeface="+mn-ea"/>
+                <a:cs typeface="+mn-cs"/>
+              </a:defRPr>
+            </a:lvl2pPr>
+            <a:lvl3pPr marL="1143000" indent="-228600" algn="l" defTabSz="457200" rtl="0" eaLnBrk="1" latinLnBrk="0" hangingPunct="1">
+              <a:spcBef>
+                <a:spcPts val="1000"/>
+              </a:spcBef>
+              <a:spcAft>
+                <a:spcPts val="0"/>
+              </a:spcAft>
+              <a:buClr>
+                <a:schemeClr val="accent1"/>
+              </a:buClr>
+              <a:buSzPct val="80000"/>
+              <a:buFont typeface="Wingdings 3" charset="2"/>
+              <a:buChar char=""/>
+              <a:defRPr sz="1400" b="0" i="0" kern="1200">
+                <a:solidFill>
+                  <a:schemeClr val="tx1">
+                    <a:lumMod val="75000"/>
+                    <a:lumOff val="25000"/>
+                  </a:schemeClr>
+                </a:solidFill>
+                <a:latin typeface="+mn-lt"/>
+                <a:ea typeface="+mn-ea"/>
+                <a:cs typeface="+mn-cs"/>
+              </a:defRPr>
+            </a:lvl3pPr>
+            <a:lvl4pPr marL="1600200" indent="-228600" algn="l" defTabSz="457200" rtl="0" eaLnBrk="1" latinLnBrk="0" hangingPunct="1">
+              <a:spcBef>
+                <a:spcPts val="1000"/>
+              </a:spcBef>
+              <a:spcAft>
+                <a:spcPts val="0"/>
+              </a:spcAft>
+              <a:buClr>
+                <a:schemeClr val="accent1"/>
+              </a:buClr>
+              <a:buSzPct val="80000"/>
+              <a:buFont typeface="Wingdings 3" charset="2"/>
+              <a:buChar char=""/>
+              <a:defRPr sz="1200" b="0" i="0" kern="1200">
+                <a:solidFill>
+                  <a:schemeClr val="tx1">
+                    <a:lumMod val="75000"/>
+                    <a:lumOff val="25000"/>
+                  </a:schemeClr>
+                </a:solidFill>
+                <a:latin typeface="+mn-lt"/>
+                <a:ea typeface="+mn-ea"/>
+                <a:cs typeface="+mn-cs"/>
+              </a:defRPr>
+            </a:lvl4pPr>
+            <a:lvl5pPr marL="2057400" indent="-228600" algn="l" defTabSz="457200" rtl="0" eaLnBrk="1" latinLnBrk="0" hangingPunct="1">
+              <a:spcBef>
+                <a:spcPts val="1000"/>
+              </a:spcBef>
+              <a:spcAft>
+                <a:spcPts val="0"/>
+              </a:spcAft>
+              <a:buClr>
+                <a:schemeClr val="accent1"/>
+              </a:buClr>
+              <a:buSzPct val="80000"/>
+              <a:buFont typeface="Wingdings 3" charset="2"/>
+              <a:buChar char=""/>
+              <a:defRPr sz="1200" b="0" i="0" kern="1200">
+                <a:solidFill>
+                  <a:schemeClr val="tx1">
+                    <a:lumMod val="75000"/>
+                    <a:lumOff val="25000"/>
+                  </a:schemeClr>
+                </a:solidFill>
+                <a:latin typeface="+mn-lt"/>
+                <a:ea typeface="+mn-ea"/>
+                <a:cs typeface="+mn-cs"/>
+              </a:defRPr>
+            </a:lvl5pPr>
+            <a:lvl6pPr marL="2514600" indent="-228600" algn="l" defTabSz="457200" rtl="0" eaLnBrk="1" latinLnBrk="0" hangingPunct="1">
+              <a:spcBef>
+                <a:spcPts val="1000"/>
+              </a:spcBef>
+              <a:spcAft>
+                <a:spcPts val="0"/>
+              </a:spcAft>
+              <a:buClr>
+                <a:schemeClr val="accent1"/>
+              </a:buClr>
+              <a:buSzPct val="80000"/>
+              <a:buFont typeface="Wingdings 3" charset="2"/>
+              <a:buChar char=""/>
+              <a:defRPr sz="1200" b="0" i="0" kern="1200">
+                <a:solidFill>
+                  <a:schemeClr val="tx1">
+                    <a:lumMod val="75000"/>
+                    <a:lumOff val="25000"/>
+                  </a:schemeClr>
+                </a:solidFill>
+                <a:latin typeface="+mn-lt"/>
+                <a:ea typeface="+mn-ea"/>
+                <a:cs typeface="+mn-cs"/>
+              </a:defRPr>
+            </a:lvl6pPr>
+            <a:lvl7pPr marL="2971800" indent="-228600" algn="l" defTabSz="457200" rtl="0" eaLnBrk="1" latinLnBrk="0" hangingPunct="1">
+              <a:spcBef>
+                <a:spcPts val="1000"/>
+              </a:spcBef>
+              <a:spcAft>
+                <a:spcPts val="0"/>
+              </a:spcAft>
+              <a:buClr>
+                <a:schemeClr val="accent1"/>
+              </a:buClr>
+              <a:buSzPct val="80000"/>
+              <a:buFont typeface="Wingdings 3" charset="2"/>
+              <a:buChar char=""/>
+              <a:defRPr sz="1200" b="0" i="0" kern="1200">
+                <a:solidFill>
+                  <a:schemeClr val="tx1">
+                    <a:lumMod val="75000"/>
+                    <a:lumOff val="25000"/>
+                  </a:schemeClr>
+                </a:solidFill>
+                <a:latin typeface="+mn-lt"/>
+                <a:ea typeface="+mn-ea"/>
+                <a:cs typeface="+mn-cs"/>
+              </a:defRPr>
+            </a:lvl7pPr>
+            <a:lvl8pPr marL="3429000" indent="-228600" algn="l" defTabSz="457200" rtl="0" eaLnBrk="1" latinLnBrk="0" hangingPunct="1">
+              <a:spcBef>
+                <a:spcPts val="1000"/>
+              </a:spcBef>
+              <a:spcAft>
+                <a:spcPts val="0"/>
+              </a:spcAft>
+              <a:buClr>
+                <a:schemeClr val="accent1"/>
+              </a:buClr>
+              <a:buSzPct val="80000"/>
+              <a:buFont typeface="Wingdings 3" charset="2"/>
+              <a:buChar char=""/>
+              <a:defRPr sz="1200" b="0" i="0" kern="1200">
+                <a:solidFill>
+                  <a:schemeClr val="tx1">
+                    <a:lumMod val="75000"/>
+                    <a:lumOff val="25000"/>
+                  </a:schemeClr>
+                </a:solidFill>
+                <a:latin typeface="+mn-lt"/>
+                <a:ea typeface="+mn-ea"/>
+                <a:cs typeface="+mn-cs"/>
+              </a:defRPr>
+            </a:lvl8pPr>
+            <a:lvl9pPr marL="3886200" indent="-228600" algn="l" defTabSz="457200" rtl="0" eaLnBrk="1" latinLnBrk="0" hangingPunct="1">
+              <a:spcBef>
+                <a:spcPts val="1000"/>
+              </a:spcBef>
+              <a:spcAft>
+                <a:spcPts val="0"/>
+              </a:spcAft>
+              <a:buClr>
+                <a:schemeClr val="accent1"/>
+              </a:buClr>
+              <a:buSzPct val="80000"/>
+              <a:buFont typeface="Wingdings 3" charset="2"/>
+              <a:buChar char=""/>
+              <a:defRPr sz="1200" b="0" i="0" kern="1200">
+                <a:solidFill>
+                  <a:schemeClr val="tx1">
+                    <a:lumMod val="75000"/>
+                    <a:lumOff val="25000"/>
+                  </a:schemeClr>
+                </a:solidFill>
+                <a:latin typeface="+mn-lt"/>
+                <a:ea typeface="+mn-ea"/>
+                <a:cs typeface="+mn-cs"/>
+              </a:defRPr>
+            </a:lvl9pPr>
+          </a:lstStyle>
+          <a:p>
+            <a:pPr marL="0" indent="0">
+              <a:buNone/>
+            </a:pPr>
+            <a:r>
+              <a:rPr lang="es-ES" b="1" dirty="0" smtClean="0"/>
+              <a:t>Lenguaje</a:t>
+            </a:r>
+          </a:p>
+          <a:p>
+            <a:r>
+              <a:rPr lang="es-ES" dirty="0" err="1" smtClean="0"/>
+              <a:t>Python</a:t>
+            </a:r>
+            <a:r>
+              <a:rPr lang="es-ES" dirty="0" smtClean="0"/>
+              <a:t> V 3.11.9</a:t>
+            </a:r>
+          </a:p>
+        </p:txBody>
+      </p:sp>
+      <p:sp>
+        <p:nvSpPr>
+          <p:cNvPr id="9" name="Marcador de contenido 2"/>
+          <p:cNvSpPr txBox="1">
+            <a:spLocks/>
+          </p:cNvSpPr>
+          <p:nvPr/>
+        </p:nvSpPr>
+        <p:spPr>
+          <a:xfrm>
+            <a:off x="997467" y="3990737"/>
+            <a:ext cx="3059628" cy="1009584"/>
+          </a:xfrm>
+          <a:prstGeom prst="rect">
+            <a:avLst/>
+          </a:prstGeom>
+        </p:spPr>
+        <p:txBody>
+          <a:bodyPr vert="horz" lIns="91440" tIns="45720" rIns="91440" bIns="45720" rtlCol="0">
+            <a:normAutofit/>
+          </a:bodyPr>
+          <a:lstStyle>
+            <a:lvl1pPr marL="342900" indent="-342900" algn="l" defTabSz="457200" rtl="0" eaLnBrk="1" latinLnBrk="0" hangingPunct="1">
+              <a:spcBef>
+                <a:spcPts val="1000"/>
+              </a:spcBef>
+              <a:spcAft>
+                <a:spcPts val="0"/>
+              </a:spcAft>
+              <a:buClr>
+                <a:schemeClr val="accent1"/>
+              </a:buClr>
+              <a:buSzPct val="80000"/>
+              <a:buFont typeface="Wingdings 3" charset="2"/>
+              <a:buChar char=""/>
+              <a:defRPr sz="1800" b="0" i="0" kern="1200">
+                <a:solidFill>
+                  <a:schemeClr val="tx1">
+                    <a:lumMod val="75000"/>
+                    <a:lumOff val="25000"/>
+                  </a:schemeClr>
+                </a:solidFill>
+                <a:latin typeface="+mn-lt"/>
+                <a:ea typeface="+mn-ea"/>
+                <a:cs typeface="+mn-cs"/>
+              </a:defRPr>
+            </a:lvl1pPr>
+            <a:lvl2pPr marL="742950" indent="-285750" algn="l" defTabSz="457200" rtl="0" eaLnBrk="1" latinLnBrk="0" hangingPunct="1">
+              <a:spcBef>
+                <a:spcPts val="1000"/>
+              </a:spcBef>
+              <a:spcAft>
+                <a:spcPts val="0"/>
+              </a:spcAft>
+              <a:buClr>
+                <a:schemeClr val="accent1"/>
+              </a:buClr>
+              <a:buSzPct val="80000"/>
+              <a:buFont typeface="Wingdings 3" charset="2"/>
+              <a:buChar char=""/>
+              <a:defRPr sz="1600" b="0" i="0" kern="1200">
+                <a:solidFill>
+                  <a:schemeClr val="tx1">
+                    <a:lumMod val="75000"/>
+                    <a:lumOff val="25000"/>
+                  </a:schemeClr>
+                </a:solidFill>
+                <a:latin typeface="+mn-lt"/>
+                <a:ea typeface="+mn-ea"/>
+                <a:cs typeface="+mn-cs"/>
+              </a:defRPr>
+            </a:lvl2pPr>
+            <a:lvl3pPr marL="1143000" indent="-228600" algn="l" defTabSz="457200" rtl="0" eaLnBrk="1" latinLnBrk="0" hangingPunct="1">
+              <a:spcBef>
+                <a:spcPts val="1000"/>
+              </a:spcBef>
+              <a:spcAft>
+                <a:spcPts val="0"/>
+              </a:spcAft>
+              <a:buClr>
+                <a:schemeClr val="accent1"/>
+              </a:buClr>
+              <a:buSzPct val="80000"/>
+              <a:buFont typeface="Wingdings 3" charset="2"/>
+              <a:buChar char=""/>
+              <a:defRPr sz="1400" b="0" i="0" kern="1200">
+                <a:solidFill>
+                  <a:schemeClr val="tx1">
+                    <a:lumMod val="75000"/>
+                    <a:lumOff val="25000"/>
+                  </a:schemeClr>
+                </a:solidFill>
+                <a:latin typeface="+mn-lt"/>
+                <a:ea typeface="+mn-ea"/>
+                <a:cs typeface="+mn-cs"/>
+              </a:defRPr>
+            </a:lvl3pPr>
+            <a:lvl4pPr marL="1600200" indent="-228600" algn="l" defTabSz="457200" rtl="0" eaLnBrk="1" latinLnBrk="0" hangingPunct="1">
+              <a:spcBef>
+                <a:spcPts val="1000"/>
+              </a:spcBef>
+              <a:spcAft>
+                <a:spcPts val="0"/>
+              </a:spcAft>
+              <a:buClr>
+                <a:schemeClr val="accent1"/>
+              </a:buClr>
+              <a:buSzPct val="80000"/>
+              <a:buFont typeface="Wingdings 3" charset="2"/>
+              <a:buChar char=""/>
+              <a:defRPr sz="1200" b="0" i="0" kern="1200">
+                <a:solidFill>
+                  <a:schemeClr val="tx1">
+                    <a:lumMod val="75000"/>
+                    <a:lumOff val="25000"/>
+                  </a:schemeClr>
+                </a:solidFill>
+                <a:latin typeface="+mn-lt"/>
+                <a:ea typeface="+mn-ea"/>
+                <a:cs typeface="+mn-cs"/>
+              </a:defRPr>
+            </a:lvl4pPr>
+            <a:lvl5pPr marL="2057400" indent="-228600" algn="l" defTabSz="457200" rtl="0" eaLnBrk="1" latinLnBrk="0" hangingPunct="1">
+              <a:spcBef>
+                <a:spcPts val="1000"/>
+              </a:spcBef>
+              <a:spcAft>
+                <a:spcPts val="0"/>
+              </a:spcAft>
+              <a:buClr>
+                <a:schemeClr val="accent1"/>
+              </a:buClr>
+              <a:buSzPct val="80000"/>
+              <a:buFont typeface="Wingdings 3" charset="2"/>
+              <a:buChar char=""/>
+              <a:defRPr sz="1200" b="0" i="0" kern="1200">
+                <a:solidFill>
+                  <a:schemeClr val="tx1">
+                    <a:lumMod val="75000"/>
+                    <a:lumOff val="25000"/>
+                  </a:schemeClr>
+                </a:solidFill>
+                <a:latin typeface="+mn-lt"/>
+                <a:ea typeface="+mn-ea"/>
+                <a:cs typeface="+mn-cs"/>
+              </a:defRPr>
+            </a:lvl5pPr>
+            <a:lvl6pPr marL="2514600" indent="-228600" algn="l" defTabSz="457200" rtl="0" eaLnBrk="1" latinLnBrk="0" hangingPunct="1">
+              <a:spcBef>
+                <a:spcPts val="1000"/>
+              </a:spcBef>
+              <a:spcAft>
+                <a:spcPts val="0"/>
+              </a:spcAft>
+              <a:buClr>
+                <a:schemeClr val="accent1"/>
+              </a:buClr>
+              <a:buSzPct val="80000"/>
+              <a:buFont typeface="Wingdings 3" charset="2"/>
+              <a:buChar char=""/>
+              <a:defRPr sz="1200" b="0" i="0" kern="1200">
+                <a:solidFill>
+                  <a:schemeClr val="tx1">
+                    <a:lumMod val="75000"/>
+                    <a:lumOff val="25000"/>
+                  </a:schemeClr>
+                </a:solidFill>
+                <a:latin typeface="+mn-lt"/>
+                <a:ea typeface="+mn-ea"/>
+                <a:cs typeface="+mn-cs"/>
+              </a:defRPr>
+            </a:lvl6pPr>
+            <a:lvl7pPr marL="2971800" indent="-228600" algn="l" defTabSz="457200" rtl="0" eaLnBrk="1" latinLnBrk="0" hangingPunct="1">
+              <a:spcBef>
+                <a:spcPts val="1000"/>
+              </a:spcBef>
+              <a:spcAft>
+                <a:spcPts val="0"/>
+              </a:spcAft>
+              <a:buClr>
+                <a:schemeClr val="accent1"/>
+              </a:buClr>
+              <a:buSzPct val="80000"/>
+              <a:buFont typeface="Wingdings 3" charset="2"/>
+              <a:buChar char=""/>
+              <a:defRPr sz="1200" b="0" i="0" kern="1200">
+                <a:solidFill>
+                  <a:schemeClr val="tx1">
+                    <a:lumMod val="75000"/>
+                    <a:lumOff val="25000"/>
+                  </a:schemeClr>
+                </a:solidFill>
+                <a:latin typeface="+mn-lt"/>
+                <a:ea typeface="+mn-ea"/>
+                <a:cs typeface="+mn-cs"/>
+              </a:defRPr>
+            </a:lvl7pPr>
+            <a:lvl8pPr marL="3429000" indent="-228600" algn="l" defTabSz="457200" rtl="0" eaLnBrk="1" latinLnBrk="0" hangingPunct="1">
+              <a:spcBef>
+                <a:spcPts val="1000"/>
+              </a:spcBef>
+              <a:spcAft>
+                <a:spcPts val="0"/>
+              </a:spcAft>
+              <a:buClr>
+                <a:schemeClr val="accent1"/>
+              </a:buClr>
+              <a:buSzPct val="80000"/>
+              <a:buFont typeface="Wingdings 3" charset="2"/>
+              <a:buChar char=""/>
+              <a:defRPr sz="1200" b="0" i="0" kern="1200">
+                <a:solidFill>
+                  <a:schemeClr val="tx1">
+                    <a:lumMod val="75000"/>
+                    <a:lumOff val="25000"/>
+                  </a:schemeClr>
+                </a:solidFill>
+                <a:latin typeface="+mn-lt"/>
+                <a:ea typeface="+mn-ea"/>
+                <a:cs typeface="+mn-cs"/>
+              </a:defRPr>
+            </a:lvl8pPr>
+            <a:lvl9pPr marL="3886200" indent="-228600" algn="l" defTabSz="457200" rtl="0" eaLnBrk="1" latinLnBrk="0" hangingPunct="1">
+              <a:spcBef>
+                <a:spcPts val="1000"/>
+              </a:spcBef>
+              <a:spcAft>
+                <a:spcPts val="0"/>
+              </a:spcAft>
+              <a:buClr>
+                <a:schemeClr val="accent1"/>
+              </a:buClr>
+              <a:buSzPct val="80000"/>
+              <a:buFont typeface="Wingdings 3" charset="2"/>
+              <a:buChar char=""/>
+              <a:defRPr sz="1200" b="0" i="0" kern="1200">
+                <a:solidFill>
+                  <a:schemeClr val="tx1">
+                    <a:lumMod val="75000"/>
+                    <a:lumOff val="25000"/>
+                  </a:schemeClr>
+                </a:solidFill>
+                <a:latin typeface="+mn-lt"/>
+                <a:ea typeface="+mn-ea"/>
+                <a:cs typeface="+mn-cs"/>
+              </a:defRPr>
+            </a:lvl9pPr>
+          </a:lstStyle>
+          <a:p>
+            <a:pPr marL="0" indent="0">
+              <a:buNone/>
+            </a:pPr>
+            <a:r>
+              <a:rPr lang="es-ES" b="1" dirty="0" smtClean="0"/>
+              <a:t>Base de datos</a:t>
+            </a:r>
+          </a:p>
+          <a:p>
+            <a:r>
+              <a:rPr lang="es-ES" dirty="0" err="1" smtClean="0"/>
+              <a:t>PostgreSQL</a:t>
+            </a:r>
+            <a:r>
+              <a:rPr lang="es-ES" dirty="0" smtClean="0"/>
+              <a:t> V 15.2</a:t>
+            </a:r>
+          </a:p>
+          <a:p>
+            <a:pPr marL="0" indent="0">
+              <a:buNone/>
+            </a:pPr>
+            <a:endParaRPr lang="es-ES" dirty="0"/>
+          </a:p>
+        </p:txBody>
+      </p:sp>
+      <p:sp>
+        <p:nvSpPr>
+          <p:cNvPr id="10" name="Marcador de contenido 2"/>
+          <p:cNvSpPr txBox="1">
+            <a:spLocks/>
+          </p:cNvSpPr>
+          <p:nvPr/>
+        </p:nvSpPr>
+        <p:spPr>
+          <a:xfrm>
+            <a:off x="5535659" y="2514852"/>
+            <a:ext cx="4544467" cy="2228297"/>
+          </a:xfrm>
+          <a:prstGeom prst="rect">
+            <a:avLst/>
+          </a:prstGeom>
+        </p:spPr>
+        <p:txBody>
+          <a:bodyPr vert="horz" lIns="91440" tIns="45720" rIns="91440" bIns="45720" rtlCol="0">
+            <a:normAutofit fontScale="92500" lnSpcReduction="10000"/>
+          </a:bodyPr>
+          <a:lstStyle>
+            <a:lvl1pPr marL="342900" indent="-342900" algn="l" defTabSz="457200" rtl="0" eaLnBrk="1" latinLnBrk="0" hangingPunct="1">
+              <a:spcBef>
+                <a:spcPts val="1000"/>
+              </a:spcBef>
+              <a:spcAft>
+                <a:spcPts val="0"/>
+              </a:spcAft>
+              <a:buClr>
+                <a:schemeClr val="accent1"/>
+              </a:buClr>
+              <a:buSzPct val="80000"/>
+              <a:buFont typeface="Wingdings 3" charset="2"/>
+              <a:buChar char=""/>
+              <a:defRPr sz="1800" b="0" i="0" kern="1200">
+                <a:solidFill>
+                  <a:schemeClr val="tx1">
+                    <a:lumMod val="75000"/>
+                    <a:lumOff val="25000"/>
+                  </a:schemeClr>
+                </a:solidFill>
+                <a:latin typeface="+mn-lt"/>
+                <a:ea typeface="+mn-ea"/>
+                <a:cs typeface="+mn-cs"/>
+              </a:defRPr>
+            </a:lvl1pPr>
+            <a:lvl2pPr marL="742950" indent="-285750" algn="l" defTabSz="457200" rtl="0" eaLnBrk="1" latinLnBrk="0" hangingPunct="1">
+              <a:spcBef>
+                <a:spcPts val="1000"/>
+              </a:spcBef>
+              <a:spcAft>
+                <a:spcPts val="0"/>
+              </a:spcAft>
+              <a:buClr>
+                <a:schemeClr val="accent1"/>
+              </a:buClr>
+              <a:buSzPct val="80000"/>
+              <a:buFont typeface="Wingdings 3" charset="2"/>
+              <a:buChar char=""/>
+              <a:defRPr sz="1600" b="0" i="0" kern="1200">
+                <a:solidFill>
+                  <a:schemeClr val="tx1">
+                    <a:lumMod val="75000"/>
+                    <a:lumOff val="25000"/>
+                  </a:schemeClr>
+                </a:solidFill>
+                <a:latin typeface="+mn-lt"/>
+                <a:ea typeface="+mn-ea"/>
+                <a:cs typeface="+mn-cs"/>
+              </a:defRPr>
+            </a:lvl2pPr>
+            <a:lvl3pPr marL="1143000" indent="-228600" algn="l" defTabSz="457200" rtl="0" eaLnBrk="1" latinLnBrk="0" hangingPunct="1">
+              <a:spcBef>
+                <a:spcPts val="1000"/>
+              </a:spcBef>
+              <a:spcAft>
+                <a:spcPts val="0"/>
+              </a:spcAft>
+              <a:buClr>
+                <a:schemeClr val="accent1"/>
+              </a:buClr>
+              <a:buSzPct val="80000"/>
+              <a:buFont typeface="Wingdings 3" charset="2"/>
+              <a:buChar char=""/>
+              <a:defRPr sz="1400" b="0" i="0" kern="1200">
+                <a:solidFill>
+                  <a:schemeClr val="tx1">
+                    <a:lumMod val="75000"/>
+                    <a:lumOff val="25000"/>
+                  </a:schemeClr>
+                </a:solidFill>
+                <a:latin typeface="+mn-lt"/>
+                <a:ea typeface="+mn-ea"/>
+                <a:cs typeface="+mn-cs"/>
+              </a:defRPr>
+            </a:lvl3pPr>
+            <a:lvl4pPr marL="1600200" indent="-228600" algn="l" defTabSz="457200" rtl="0" eaLnBrk="1" latinLnBrk="0" hangingPunct="1">
+              <a:spcBef>
+                <a:spcPts val="1000"/>
+              </a:spcBef>
+              <a:spcAft>
+                <a:spcPts val="0"/>
+              </a:spcAft>
+              <a:buClr>
+                <a:schemeClr val="accent1"/>
+              </a:buClr>
+              <a:buSzPct val="80000"/>
+              <a:buFont typeface="Wingdings 3" charset="2"/>
+              <a:buChar char=""/>
+              <a:defRPr sz="1200" b="0" i="0" kern="1200">
+                <a:solidFill>
+                  <a:schemeClr val="tx1">
+                    <a:lumMod val="75000"/>
+                    <a:lumOff val="25000"/>
+                  </a:schemeClr>
+                </a:solidFill>
+                <a:latin typeface="+mn-lt"/>
+                <a:ea typeface="+mn-ea"/>
+                <a:cs typeface="+mn-cs"/>
+              </a:defRPr>
+            </a:lvl4pPr>
+            <a:lvl5pPr marL="2057400" indent="-228600" algn="l" defTabSz="457200" rtl="0" eaLnBrk="1" latinLnBrk="0" hangingPunct="1">
+              <a:spcBef>
+                <a:spcPts val="1000"/>
+              </a:spcBef>
+              <a:spcAft>
+                <a:spcPts val="0"/>
+              </a:spcAft>
+              <a:buClr>
+                <a:schemeClr val="accent1"/>
+              </a:buClr>
+              <a:buSzPct val="80000"/>
+              <a:buFont typeface="Wingdings 3" charset="2"/>
+              <a:buChar char=""/>
+              <a:defRPr sz="1200" b="0" i="0" kern="1200">
+                <a:solidFill>
+                  <a:schemeClr val="tx1">
+                    <a:lumMod val="75000"/>
+                    <a:lumOff val="25000"/>
+                  </a:schemeClr>
+                </a:solidFill>
+                <a:latin typeface="+mn-lt"/>
+                <a:ea typeface="+mn-ea"/>
+                <a:cs typeface="+mn-cs"/>
+              </a:defRPr>
+            </a:lvl5pPr>
+            <a:lvl6pPr marL="2514600" indent="-228600" algn="l" defTabSz="457200" rtl="0" eaLnBrk="1" latinLnBrk="0" hangingPunct="1">
+              <a:spcBef>
+                <a:spcPts val="1000"/>
+              </a:spcBef>
+              <a:spcAft>
+                <a:spcPts val="0"/>
+              </a:spcAft>
+              <a:buClr>
+                <a:schemeClr val="accent1"/>
+              </a:buClr>
+              <a:buSzPct val="80000"/>
+              <a:buFont typeface="Wingdings 3" charset="2"/>
+              <a:buChar char=""/>
+              <a:defRPr sz="1200" b="0" i="0" kern="1200">
+                <a:solidFill>
+                  <a:schemeClr val="tx1">
+                    <a:lumMod val="75000"/>
+                    <a:lumOff val="25000"/>
+                  </a:schemeClr>
+                </a:solidFill>
+                <a:latin typeface="+mn-lt"/>
+                <a:ea typeface="+mn-ea"/>
+                <a:cs typeface="+mn-cs"/>
+              </a:defRPr>
+            </a:lvl6pPr>
+            <a:lvl7pPr marL="2971800" indent="-228600" algn="l" defTabSz="457200" rtl="0" eaLnBrk="1" latinLnBrk="0" hangingPunct="1">
+              <a:spcBef>
+                <a:spcPts val="1000"/>
+              </a:spcBef>
+              <a:spcAft>
+                <a:spcPts val="0"/>
+              </a:spcAft>
+              <a:buClr>
+                <a:schemeClr val="accent1"/>
+              </a:buClr>
+              <a:buSzPct val="80000"/>
+              <a:buFont typeface="Wingdings 3" charset="2"/>
+              <a:buChar char=""/>
+              <a:defRPr sz="1200" b="0" i="0" kern="1200">
+                <a:solidFill>
+                  <a:schemeClr val="tx1">
+                    <a:lumMod val="75000"/>
+                    <a:lumOff val="25000"/>
+                  </a:schemeClr>
+                </a:solidFill>
+                <a:latin typeface="+mn-lt"/>
+                <a:ea typeface="+mn-ea"/>
+                <a:cs typeface="+mn-cs"/>
+              </a:defRPr>
+            </a:lvl7pPr>
+            <a:lvl8pPr marL="3429000" indent="-228600" algn="l" defTabSz="457200" rtl="0" eaLnBrk="1" latinLnBrk="0" hangingPunct="1">
+              <a:spcBef>
+                <a:spcPts val="1000"/>
+              </a:spcBef>
+              <a:spcAft>
+                <a:spcPts val="0"/>
+              </a:spcAft>
+              <a:buClr>
+                <a:schemeClr val="accent1"/>
+              </a:buClr>
+              <a:buSzPct val="80000"/>
+              <a:buFont typeface="Wingdings 3" charset="2"/>
+              <a:buChar char=""/>
+              <a:defRPr sz="1200" b="0" i="0" kern="1200">
+                <a:solidFill>
+                  <a:schemeClr val="tx1">
+                    <a:lumMod val="75000"/>
+                    <a:lumOff val="25000"/>
+                  </a:schemeClr>
+                </a:solidFill>
+                <a:latin typeface="+mn-lt"/>
+                <a:ea typeface="+mn-ea"/>
+                <a:cs typeface="+mn-cs"/>
+              </a:defRPr>
+            </a:lvl8pPr>
+            <a:lvl9pPr marL="3886200" indent="-228600" algn="l" defTabSz="457200" rtl="0" eaLnBrk="1" latinLnBrk="0" hangingPunct="1">
+              <a:spcBef>
+                <a:spcPts val="1000"/>
+              </a:spcBef>
+              <a:spcAft>
+                <a:spcPts val="0"/>
+              </a:spcAft>
+              <a:buClr>
+                <a:schemeClr val="accent1"/>
+              </a:buClr>
+              <a:buSzPct val="80000"/>
+              <a:buFont typeface="Wingdings 3" charset="2"/>
+              <a:buChar char=""/>
+              <a:defRPr sz="1200" b="0" i="0" kern="1200">
+                <a:solidFill>
+                  <a:schemeClr val="tx1">
+                    <a:lumMod val="75000"/>
+                    <a:lumOff val="25000"/>
+                  </a:schemeClr>
+                </a:solidFill>
+                <a:latin typeface="+mn-lt"/>
+                <a:ea typeface="+mn-ea"/>
+                <a:cs typeface="+mn-cs"/>
+              </a:defRPr>
+            </a:lvl9pPr>
+          </a:lstStyle>
+          <a:p>
+            <a:pPr marL="0" indent="0">
+              <a:buNone/>
+            </a:pPr>
+            <a:r>
+              <a:rPr lang="es-ES" b="1" dirty="0" smtClean="0"/>
+              <a:t>Bibliotecas</a:t>
+            </a:r>
+          </a:p>
+          <a:p>
+            <a:r>
+              <a:rPr lang="es-ES" dirty="0" err="1"/>
+              <a:t>Tensorflow</a:t>
+            </a:r>
+            <a:r>
+              <a:rPr lang="es-ES" dirty="0"/>
+              <a:t> V 2.15.0</a:t>
+            </a:r>
+          </a:p>
+          <a:p>
+            <a:r>
+              <a:rPr lang="es-ES" dirty="0" err="1"/>
+              <a:t>Keras</a:t>
+            </a:r>
+            <a:r>
+              <a:rPr lang="es-ES" dirty="0"/>
+              <a:t> V 2.15.0</a:t>
+            </a:r>
+          </a:p>
+          <a:p>
+            <a:r>
+              <a:rPr lang="es-ES" dirty="0" err="1"/>
+              <a:t>TensorFlow</a:t>
+            </a:r>
+            <a:r>
+              <a:rPr lang="es-ES" dirty="0"/>
+              <a:t> </a:t>
+            </a:r>
+            <a:r>
+              <a:rPr lang="es-ES" dirty="0" err="1"/>
+              <a:t>Recommenders</a:t>
+            </a:r>
+            <a:r>
+              <a:rPr lang="es-ES" dirty="0"/>
+              <a:t> V </a:t>
+            </a:r>
+            <a:r>
+              <a:rPr lang="es-ES" dirty="0" smtClean="0"/>
+              <a:t>0.7.3</a:t>
+            </a:r>
+          </a:p>
+          <a:p>
+            <a:r>
+              <a:rPr lang="es-ES" dirty="0" err="1"/>
+              <a:t>NumPy</a:t>
+            </a:r>
+            <a:r>
+              <a:rPr lang="es-ES" dirty="0"/>
+              <a:t> </a:t>
+            </a:r>
+          </a:p>
+          <a:p>
+            <a:r>
+              <a:rPr lang="es-ES" dirty="0"/>
+              <a:t>Pandas</a:t>
+            </a:r>
+          </a:p>
+          <a:p>
+            <a:endParaRPr lang="es-ES" b="1" dirty="0"/>
+          </a:p>
+          <a:p>
+            <a:pPr marL="0" indent="0">
+              <a:buNone/>
+            </a:pPr>
+            <a:endParaRPr lang="es-ES" dirty="0"/>
+          </a:p>
+        </p:txBody>
+      </p:sp>
+      <p:sp>
+        <p:nvSpPr>
+          <p:cNvPr id="11" name="Marcador de contenido 2"/>
+          <p:cNvSpPr txBox="1">
+            <a:spLocks/>
+          </p:cNvSpPr>
+          <p:nvPr/>
+        </p:nvSpPr>
+        <p:spPr>
+          <a:xfrm>
+            <a:off x="997467" y="5577369"/>
+            <a:ext cx="3912673" cy="1009584"/>
+          </a:xfrm>
+          <a:prstGeom prst="rect">
+            <a:avLst/>
+          </a:prstGeom>
+        </p:spPr>
+        <p:txBody>
+          <a:bodyPr vert="horz" lIns="91440" tIns="45720" rIns="91440" bIns="45720" rtlCol="0">
+            <a:normAutofit/>
+          </a:bodyPr>
+          <a:lstStyle>
+            <a:lvl1pPr marL="342900" indent="-342900" algn="l" defTabSz="457200" rtl="0" eaLnBrk="1" latinLnBrk="0" hangingPunct="1">
+              <a:spcBef>
+                <a:spcPts val="1000"/>
+              </a:spcBef>
+              <a:spcAft>
+                <a:spcPts val="0"/>
+              </a:spcAft>
+              <a:buClr>
+                <a:schemeClr val="accent1"/>
+              </a:buClr>
+              <a:buSzPct val="80000"/>
+              <a:buFont typeface="Wingdings 3" charset="2"/>
+              <a:buChar char=""/>
+              <a:defRPr sz="1800" b="0" i="0" kern="1200">
+                <a:solidFill>
+                  <a:schemeClr val="tx1">
+                    <a:lumMod val="75000"/>
+                    <a:lumOff val="25000"/>
+                  </a:schemeClr>
+                </a:solidFill>
+                <a:latin typeface="+mn-lt"/>
+                <a:ea typeface="+mn-ea"/>
+                <a:cs typeface="+mn-cs"/>
+              </a:defRPr>
+            </a:lvl1pPr>
+            <a:lvl2pPr marL="742950" indent="-285750" algn="l" defTabSz="457200" rtl="0" eaLnBrk="1" latinLnBrk="0" hangingPunct="1">
+              <a:spcBef>
+                <a:spcPts val="1000"/>
+              </a:spcBef>
+              <a:spcAft>
+                <a:spcPts val="0"/>
+              </a:spcAft>
+              <a:buClr>
+                <a:schemeClr val="accent1"/>
+              </a:buClr>
+              <a:buSzPct val="80000"/>
+              <a:buFont typeface="Wingdings 3" charset="2"/>
+              <a:buChar char=""/>
+              <a:defRPr sz="1600" b="0" i="0" kern="1200">
+                <a:solidFill>
+                  <a:schemeClr val="tx1">
+                    <a:lumMod val="75000"/>
+                    <a:lumOff val="25000"/>
+                  </a:schemeClr>
+                </a:solidFill>
+                <a:latin typeface="+mn-lt"/>
+                <a:ea typeface="+mn-ea"/>
+                <a:cs typeface="+mn-cs"/>
+              </a:defRPr>
+            </a:lvl2pPr>
+            <a:lvl3pPr marL="1143000" indent="-228600" algn="l" defTabSz="457200" rtl="0" eaLnBrk="1" latinLnBrk="0" hangingPunct="1">
+              <a:spcBef>
+                <a:spcPts val="1000"/>
+              </a:spcBef>
+              <a:spcAft>
+                <a:spcPts val="0"/>
+              </a:spcAft>
+              <a:buClr>
+                <a:schemeClr val="accent1"/>
+              </a:buClr>
+              <a:buSzPct val="80000"/>
+              <a:buFont typeface="Wingdings 3" charset="2"/>
+              <a:buChar char=""/>
+              <a:defRPr sz="1400" b="0" i="0" kern="1200">
+                <a:solidFill>
+                  <a:schemeClr val="tx1">
+                    <a:lumMod val="75000"/>
+                    <a:lumOff val="25000"/>
+                  </a:schemeClr>
+                </a:solidFill>
+                <a:latin typeface="+mn-lt"/>
+                <a:ea typeface="+mn-ea"/>
+                <a:cs typeface="+mn-cs"/>
+              </a:defRPr>
+            </a:lvl3pPr>
+            <a:lvl4pPr marL="1600200" indent="-228600" algn="l" defTabSz="457200" rtl="0" eaLnBrk="1" latinLnBrk="0" hangingPunct="1">
+              <a:spcBef>
+                <a:spcPts val="1000"/>
+              </a:spcBef>
+              <a:spcAft>
+                <a:spcPts val="0"/>
+              </a:spcAft>
+              <a:buClr>
+                <a:schemeClr val="accent1"/>
+              </a:buClr>
+              <a:buSzPct val="80000"/>
+              <a:buFont typeface="Wingdings 3" charset="2"/>
+              <a:buChar char=""/>
+              <a:defRPr sz="1200" b="0" i="0" kern="1200">
+                <a:solidFill>
+                  <a:schemeClr val="tx1">
+                    <a:lumMod val="75000"/>
+                    <a:lumOff val="25000"/>
+                  </a:schemeClr>
+                </a:solidFill>
+                <a:latin typeface="+mn-lt"/>
+                <a:ea typeface="+mn-ea"/>
+                <a:cs typeface="+mn-cs"/>
+              </a:defRPr>
+            </a:lvl4pPr>
+            <a:lvl5pPr marL="2057400" indent="-228600" algn="l" defTabSz="457200" rtl="0" eaLnBrk="1" latinLnBrk="0" hangingPunct="1">
+              <a:spcBef>
+                <a:spcPts val="1000"/>
+              </a:spcBef>
+              <a:spcAft>
+                <a:spcPts val="0"/>
+              </a:spcAft>
+              <a:buClr>
+                <a:schemeClr val="accent1"/>
+              </a:buClr>
+              <a:buSzPct val="80000"/>
+              <a:buFont typeface="Wingdings 3" charset="2"/>
+              <a:buChar char=""/>
+              <a:defRPr sz="1200" b="0" i="0" kern="1200">
+                <a:solidFill>
+                  <a:schemeClr val="tx1">
+                    <a:lumMod val="75000"/>
+                    <a:lumOff val="25000"/>
+                  </a:schemeClr>
+                </a:solidFill>
+                <a:latin typeface="+mn-lt"/>
+                <a:ea typeface="+mn-ea"/>
+                <a:cs typeface="+mn-cs"/>
+              </a:defRPr>
+            </a:lvl5pPr>
+            <a:lvl6pPr marL="2514600" indent="-228600" algn="l" defTabSz="457200" rtl="0" eaLnBrk="1" latinLnBrk="0" hangingPunct="1">
+              <a:spcBef>
+                <a:spcPts val="1000"/>
+              </a:spcBef>
+              <a:spcAft>
+                <a:spcPts val="0"/>
+              </a:spcAft>
+              <a:buClr>
+                <a:schemeClr val="accent1"/>
+              </a:buClr>
+              <a:buSzPct val="80000"/>
+              <a:buFont typeface="Wingdings 3" charset="2"/>
+              <a:buChar char=""/>
+              <a:defRPr sz="1200" b="0" i="0" kern="1200">
+                <a:solidFill>
+                  <a:schemeClr val="tx1">
+                    <a:lumMod val="75000"/>
+                    <a:lumOff val="25000"/>
+                  </a:schemeClr>
+                </a:solidFill>
+                <a:latin typeface="+mn-lt"/>
+                <a:ea typeface="+mn-ea"/>
+                <a:cs typeface="+mn-cs"/>
+              </a:defRPr>
+            </a:lvl6pPr>
+            <a:lvl7pPr marL="2971800" indent="-228600" algn="l" defTabSz="457200" rtl="0" eaLnBrk="1" latinLnBrk="0" hangingPunct="1">
+              <a:spcBef>
+                <a:spcPts val="1000"/>
+              </a:spcBef>
+              <a:spcAft>
+                <a:spcPts val="0"/>
+              </a:spcAft>
+              <a:buClr>
+                <a:schemeClr val="accent1"/>
+              </a:buClr>
+              <a:buSzPct val="80000"/>
+              <a:buFont typeface="Wingdings 3" charset="2"/>
+              <a:buChar char=""/>
+              <a:defRPr sz="1200" b="0" i="0" kern="1200">
+                <a:solidFill>
+                  <a:schemeClr val="tx1">
+                    <a:lumMod val="75000"/>
+                    <a:lumOff val="25000"/>
+                  </a:schemeClr>
+                </a:solidFill>
+                <a:latin typeface="+mn-lt"/>
+                <a:ea typeface="+mn-ea"/>
+                <a:cs typeface="+mn-cs"/>
+              </a:defRPr>
+            </a:lvl7pPr>
+            <a:lvl8pPr marL="3429000" indent="-228600" algn="l" defTabSz="457200" rtl="0" eaLnBrk="1" latinLnBrk="0" hangingPunct="1">
+              <a:spcBef>
+                <a:spcPts val="1000"/>
+              </a:spcBef>
+              <a:spcAft>
+                <a:spcPts val="0"/>
+              </a:spcAft>
+              <a:buClr>
+                <a:schemeClr val="accent1"/>
+              </a:buClr>
+              <a:buSzPct val="80000"/>
+              <a:buFont typeface="Wingdings 3" charset="2"/>
+              <a:buChar char=""/>
+              <a:defRPr sz="1200" b="0" i="0" kern="1200">
+                <a:solidFill>
+                  <a:schemeClr val="tx1">
+                    <a:lumMod val="75000"/>
+                    <a:lumOff val="25000"/>
+                  </a:schemeClr>
+                </a:solidFill>
+                <a:latin typeface="+mn-lt"/>
+                <a:ea typeface="+mn-ea"/>
+                <a:cs typeface="+mn-cs"/>
+              </a:defRPr>
+            </a:lvl8pPr>
+            <a:lvl9pPr marL="3886200" indent="-228600" algn="l" defTabSz="457200" rtl="0" eaLnBrk="1" latinLnBrk="0" hangingPunct="1">
+              <a:spcBef>
+                <a:spcPts val="1000"/>
+              </a:spcBef>
+              <a:spcAft>
+                <a:spcPts val="0"/>
+              </a:spcAft>
+              <a:buClr>
+                <a:schemeClr val="accent1"/>
+              </a:buClr>
+              <a:buSzPct val="80000"/>
+              <a:buFont typeface="Wingdings 3" charset="2"/>
+              <a:buChar char=""/>
+              <a:defRPr sz="1200" b="0" i="0" kern="1200">
+                <a:solidFill>
+                  <a:schemeClr val="tx1">
+                    <a:lumMod val="75000"/>
+                    <a:lumOff val="25000"/>
+                  </a:schemeClr>
+                </a:solidFill>
+                <a:latin typeface="+mn-lt"/>
+                <a:ea typeface="+mn-ea"/>
+                <a:cs typeface="+mn-cs"/>
+              </a:defRPr>
+            </a:lvl9pPr>
+          </a:lstStyle>
+          <a:p>
+            <a:pPr marL="0" indent="0">
+              <a:buNone/>
+            </a:pPr>
+            <a:r>
+              <a:rPr lang="es-ES" b="1" dirty="0" smtClean="0"/>
+              <a:t>Entorno de desarrollo</a:t>
+            </a:r>
+          </a:p>
+          <a:p>
+            <a:r>
+              <a:rPr lang="es-ES" dirty="0"/>
+              <a:t>Visual Studio </a:t>
+            </a:r>
+            <a:r>
+              <a:rPr lang="es-ES" dirty="0" err="1"/>
+              <a:t>Code</a:t>
+            </a:r>
+            <a:r>
+              <a:rPr lang="es-ES" dirty="0"/>
+              <a:t> V 1.92.2</a:t>
+            </a:r>
+          </a:p>
+        </p:txBody>
+      </p:sp>
+      <p:sp>
+        <p:nvSpPr>
+          <p:cNvPr id="12" name="Marcador de contenido 2"/>
+          <p:cNvSpPr txBox="1">
+            <a:spLocks/>
+          </p:cNvSpPr>
+          <p:nvPr/>
+        </p:nvSpPr>
+        <p:spPr>
+          <a:xfrm>
+            <a:off x="5535659" y="5561806"/>
+            <a:ext cx="3059628" cy="1009584"/>
+          </a:xfrm>
+          <a:prstGeom prst="rect">
+            <a:avLst/>
+          </a:prstGeom>
+        </p:spPr>
+        <p:txBody>
+          <a:bodyPr vert="horz" lIns="91440" tIns="45720" rIns="91440" bIns="45720" rtlCol="0">
+            <a:normAutofit/>
+          </a:bodyPr>
+          <a:lstStyle>
+            <a:lvl1pPr marL="342900" indent="-342900" algn="l" defTabSz="457200" rtl="0" eaLnBrk="1" latinLnBrk="0" hangingPunct="1">
+              <a:spcBef>
+                <a:spcPts val="1000"/>
+              </a:spcBef>
+              <a:spcAft>
+                <a:spcPts val="0"/>
+              </a:spcAft>
+              <a:buClr>
+                <a:schemeClr val="accent1"/>
+              </a:buClr>
+              <a:buSzPct val="80000"/>
+              <a:buFont typeface="Wingdings 3" charset="2"/>
+              <a:buChar char=""/>
+              <a:defRPr sz="1800" b="0" i="0" kern="1200">
+                <a:solidFill>
+                  <a:schemeClr val="tx1">
+                    <a:lumMod val="75000"/>
+                    <a:lumOff val="25000"/>
+                  </a:schemeClr>
+                </a:solidFill>
+                <a:latin typeface="+mn-lt"/>
+                <a:ea typeface="+mn-ea"/>
+                <a:cs typeface="+mn-cs"/>
+              </a:defRPr>
+            </a:lvl1pPr>
+            <a:lvl2pPr marL="742950" indent="-285750" algn="l" defTabSz="457200" rtl="0" eaLnBrk="1" latinLnBrk="0" hangingPunct="1">
+              <a:spcBef>
+                <a:spcPts val="1000"/>
+              </a:spcBef>
+              <a:spcAft>
+                <a:spcPts val="0"/>
+              </a:spcAft>
+              <a:buClr>
+                <a:schemeClr val="accent1"/>
+              </a:buClr>
+              <a:buSzPct val="80000"/>
+              <a:buFont typeface="Wingdings 3" charset="2"/>
+              <a:buChar char=""/>
+              <a:defRPr sz="1600" b="0" i="0" kern="1200">
+                <a:solidFill>
+                  <a:schemeClr val="tx1">
+                    <a:lumMod val="75000"/>
+                    <a:lumOff val="25000"/>
+                  </a:schemeClr>
+                </a:solidFill>
+                <a:latin typeface="+mn-lt"/>
+                <a:ea typeface="+mn-ea"/>
+                <a:cs typeface="+mn-cs"/>
+              </a:defRPr>
+            </a:lvl2pPr>
+            <a:lvl3pPr marL="1143000" indent="-228600" algn="l" defTabSz="457200" rtl="0" eaLnBrk="1" latinLnBrk="0" hangingPunct="1">
+              <a:spcBef>
+                <a:spcPts val="1000"/>
+              </a:spcBef>
+              <a:spcAft>
+                <a:spcPts val="0"/>
+              </a:spcAft>
+              <a:buClr>
+                <a:schemeClr val="accent1"/>
+              </a:buClr>
+              <a:buSzPct val="80000"/>
+              <a:buFont typeface="Wingdings 3" charset="2"/>
+              <a:buChar char=""/>
+              <a:defRPr sz="1400" b="0" i="0" kern="1200">
+                <a:solidFill>
+                  <a:schemeClr val="tx1">
+                    <a:lumMod val="75000"/>
+                    <a:lumOff val="25000"/>
+                  </a:schemeClr>
+                </a:solidFill>
+                <a:latin typeface="+mn-lt"/>
+                <a:ea typeface="+mn-ea"/>
+                <a:cs typeface="+mn-cs"/>
+              </a:defRPr>
+            </a:lvl3pPr>
+            <a:lvl4pPr marL="1600200" indent="-228600" algn="l" defTabSz="457200" rtl="0" eaLnBrk="1" latinLnBrk="0" hangingPunct="1">
+              <a:spcBef>
+                <a:spcPts val="1000"/>
+              </a:spcBef>
+              <a:spcAft>
+                <a:spcPts val="0"/>
+              </a:spcAft>
+              <a:buClr>
+                <a:schemeClr val="accent1"/>
+              </a:buClr>
+              <a:buSzPct val="80000"/>
+              <a:buFont typeface="Wingdings 3" charset="2"/>
+              <a:buChar char=""/>
+              <a:defRPr sz="1200" b="0" i="0" kern="1200">
+                <a:solidFill>
+                  <a:schemeClr val="tx1">
+                    <a:lumMod val="75000"/>
+                    <a:lumOff val="25000"/>
+                  </a:schemeClr>
+                </a:solidFill>
+                <a:latin typeface="+mn-lt"/>
+                <a:ea typeface="+mn-ea"/>
+                <a:cs typeface="+mn-cs"/>
+              </a:defRPr>
+            </a:lvl4pPr>
+            <a:lvl5pPr marL="2057400" indent="-228600" algn="l" defTabSz="457200" rtl="0" eaLnBrk="1" latinLnBrk="0" hangingPunct="1">
+              <a:spcBef>
+                <a:spcPts val="1000"/>
+              </a:spcBef>
+              <a:spcAft>
+                <a:spcPts val="0"/>
+              </a:spcAft>
+              <a:buClr>
+                <a:schemeClr val="accent1"/>
+              </a:buClr>
+              <a:buSzPct val="80000"/>
+              <a:buFont typeface="Wingdings 3" charset="2"/>
+              <a:buChar char=""/>
+              <a:defRPr sz="1200" b="0" i="0" kern="1200">
+                <a:solidFill>
+                  <a:schemeClr val="tx1">
+                    <a:lumMod val="75000"/>
+                    <a:lumOff val="25000"/>
+                  </a:schemeClr>
+                </a:solidFill>
+                <a:latin typeface="+mn-lt"/>
+                <a:ea typeface="+mn-ea"/>
+                <a:cs typeface="+mn-cs"/>
+              </a:defRPr>
+            </a:lvl5pPr>
+            <a:lvl6pPr marL="2514600" indent="-228600" algn="l" defTabSz="457200" rtl="0" eaLnBrk="1" latinLnBrk="0" hangingPunct="1">
+              <a:spcBef>
+                <a:spcPts val="1000"/>
+              </a:spcBef>
+              <a:spcAft>
+                <a:spcPts val="0"/>
+              </a:spcAft>
+              <a:buClr>
+                <a:schemeClr val="accent1"/>
+              </a:buClr>
+              <a:buSzPct val="80000"/>
+              <a:buFont typeface="Wingdings 3" charset="2"/>
+              <a:buChar char=""/>
+              <a:defRPr sz="1200" b="0" i="0" kern="1200">
+                <a:solidFill>
+                  <a:schemeClr val="tx1">
+                    <a:lumMod val="75000"/>
+                    <a:lumOff val="25000"/>
+                  </a:schemeClr>
+                </a:solidFill>
+                <a:latin typeface="+mn-lt"/>
+                <a:ea typeface="+mn-ea"/>
+                <a:cs typeface="+mn-cs"/>
+              </a:defRPr>
+            </a:lvl6pPr>
+            <a:lvl7pPr marL="2971800" indent="-228600" algn="l" defTabSz="457200" rtl="0" eaLnBrk="1" latinLnBrk="0" hangingPunct="1">
+              <a:spcBef>
+                <a:spcPts val="1000"/>
+              </a:spcBef>
+              <a:spcAft>
+                <a:spcPts val="0"/>
+              </a:spcAft>
+              <a:buClr>
+                <a:schemeClr val="accent1"/>
+              </a:buClr>
+              <a:buSzPct val="80000"/>
+              <a:buFont typeface="Wingdings 3" charset="2"/>
+              <a:buChar char=""/>
+              <a:defRPr sz="1200" b="0" i="0" kern="1200">
+                <a:solidFill>
+                  <a:schemeClr val="tx1">
+                    <a:lumMod val="75000"/>
+                    <a:lumOff val="25000"/>
+                  </a:schemeClr>
+                </a:solidFill>
+                <a:latin typeface="+mn-lt"/>
+                <a:ea typeface="+mn-ea"/>
+                <a:cs typeface="+mn-cs"/>
+              </a:defRPr>
+            </a:lvl7pPr>
+            <a:lvl8pPr marL="3429000" indent="-228600" algn="l" defTabSz="457200" rtl="0" eaLnBrk="1" latinLnBrk="0" hangingPunct="1">
+              <a:spcBef>
+                <a:spcPts val="1000"/>
+              </a:spcBef>
+              <a:spcAft>
+                <a:spcPts val="0"/>
+              </a:spcAft>
+              <a:buClr>
+                <a:schemeClr val="accent1"/>
+              </a:buClr>
+              <a:buSzPct val="80000"/>
+              <a:buFont typeface="Wingdings 3" charset="2"/>
+              <a:buChar char=""/>
+              <a:defRPr sz="1200" b="0" i="0" kern="1200">
+                <a:solidFill>
+                  <a:schemeClr val="tx1">
+                    <a:lumMod val="75000"/>
+                    <a:lumOff val="25000"/>
+                  </a:schemeClr>
+                </a:solidFill>
+                <a:latin typeface="+mn-lt"/>
+                <a:ea typeface="+mn-ea"/>
+                <a:cs typeface="+mn-cs"/>
+              </a:defRPr>
+            </a:lvl8pPr>
+            <a:lvl9pPr marL="3886200" indent="-228600" algn="l" defTabSz="457200" rtl="0" eaLnBrk="1" latinLnBrk="0" hangingPunct="1">
+              <a:spcBef>
+                <a:spcPts val="1000"/>
+              </a:spcBef>
+              <a:spcAft>
+                <a:spcPts val="0"/>
+              </a:spcAft>
+              <a:buClr>
+                <a:schemeClr val="accent1"/>
+              </a:buClr>
+              <a:buSzPct val="80000"/>
+              <a:buFont typeface="Wingdings 3" charset="2"/>
+              <a:buChar char=""/>
+              <a:defRPr sz="1200" b="0" i="0" kern="1200">
+                <a:solidFill>
+                  <a:schemeClr val="tx1">
+                    <a:lumMod val="75000"/>
+                    <a:lumOff val="25000"/>
+                  </a:schemeClr>
+                </a:solidFill>
+                <a:latin typeface="+mn-lt"/>
+                <a:ea typeface="+mn-ea"/>
+                <a:cs typeface="+mn-cs"/>
+              </a:defRPr>
+            </a:lvl9pPr>
+          </a:lstStyle>
+          <a:p>
+            <a:pPr marL="0" indent="0">
+              <a:buNone/>
+            </a:pPr>
+            <a:r>
+              <a:rPr lang="es-ES" b="1" dirty="0" err="1" smtClean="0"/>
+              <a:t>Backend</a:t>
+            </a:r>
+            <a:endParaRPr lang="es-ES" b="1" dirty="0" smtClean="0"/>
+          </a:p>
+          <a:p>
+            <a:r>
+              <a:rPr lang="es-ES" dirty="0" err="1" smtClean="0"/>
+              <a:t>FastApi</a:t>
+            </a:r>
+            <a:endParaRPr lang="es-ES" dirty="0" smtClean="0"/>
+          </a:p>
+          <a:p>
+            <a:pPr marL="0" indent="0">
+              <a:buNone/>
+            </a:pPr>
+            <a:endParaRPr lang="es-ES" dirty="0"/>
+          </a:p>
+        </p:txBody>
+      </p:sp>
+    </p:spTree>
+    <p:extLst>
+      <p:ext uri="{BB962C8B-B14F-4D97-AF65-F5344CB8AC3E}">
+        <p14:creationId xmlns:p14="http://schemas.microsoft.com/office/powerpoint/2010/main" val="1462309449"/>
+      </p:ext>
+    </p:extLst>
+  </p:cSld>
+  <p:clrMapOvr>
+    <a:masterClrMapping/>
+  </p:clrMapOvr>
 </p:sld>
 </file>
 

</xml_diff>